<commit_message>
Finished Final draft of poster
</commit_message>
<xml_diff>
--- a/ExpoPoster/fixedPosterRoughDraft.pptx
+++ b/ExpoPoster/fixedPosterRoughDraft.pptx
@@ -252,7 +252,7 @@
             <a:fld id="{9CF59EBC-EC05-6B4D-B166-DDFA6A1EDCB6}" type="datetimeFigureOut">
               <a:rPr lang="en-US" smtClean="0"/>
               <a:pPr/>
-              <a:t>4/26/2018</a:t>
+              <a:t>4/27/2018</a:t>
             </a:fld>
             <a:endParaRPr lang="en-US" dirty="0"/>
           </a:p>
@@ -2454,7 +2454,7 @@
         <p:spPr>
           <a:xfrm>
             <a:off x="1780392" y="6217920"/>
-            <a:ext cx="8126412" cy="9424247"/>
+            <a:ext cx="8126412" cy="12900968"/>
           </a:xfrm>
           <a:prstGeom prst="rect">
             <a:avLst/>
@@ -2640,7 +2640,7 @@
             <a:r>
               <a:rPr lang="en-US" b="1" i="1" u="none" strike="noStrike" dirty="0">
                 <a:solidFill>
-                  <a:srgbClr val="000000"/>
+                  <a:schemeClr val="bg1"/>
                 </a:solidFill>
                 <a:latin typeface="Verdana Regular"/>
               </a:rPr>
@@ -2649,7 +2649,7 @@
             <a:r>
               <a:rPr lang="en-US" b="1" i="1" u="none" strike="noStrike" dirty="0" err="1">
                 <a:solidFill>
-                  <a:srgbClr val="000000"/>
+                  <a:schemeClr val="bg1"/>
                 </a:solidFill>
                 <a:latin typeface="Verdana Regular"/>
               </a:rPr>
@@ -2658,51 +2658,58 @@
             <a:r>
               <a:rPr lang="en-US" b="1" i="1" u="none" strike="noStrike" dirty="0">
                 <a:solidFill>
-                  <a:srgbClr val="000000"/>
+                  <a:schemeClr val="bg1"/>
                 </a:solidFill>
                 <a:latin typeface="Verdana Regular"/>
               </a:rPr>
               <a:t>-Logic?</a:t>
             </a:r>
             <a:r>
-              <a:rPr lang="en-US" b="0" i="0" dirty="0">
+              <a:rPr lang="en-US" b="0" i="0" dirty="0" smtClean="0">
+                <a:solidFill>
+                  <a:schemeClr val="bg1"/>
+                </a:solidFill>
                 <a:latin typeface="Verdana Regular"/>
               </a:rPr>
               <a:t>​</a:t>
             </a:r>
           </a:p>
           <a:p>
+            <a:pPr algn="l" rtl="0">
+              <a:buFontTx/>
+              <a:buChar char="-"/>
+            </a:pPr>
+            <a:r>
+              <a:rPr lang="en-US" b="0" i="1" u="none" strike="noStrike" dirty="0" err="1" smtClean="0">
+                <a:solidFill>
+                  <a:schemeClr val="bg1"/>
+                </a:solidFill>
+                <a:latin typeface="Verdana Regular"/>
+              </a:rPr>
+              <a:t>AgBiz</a:t>
+            </a:r>
+            <a:r>
+              <a:rPr lang="en-US" b="0" i="1" u="none" strike="noStrike" dirty="0" smtClean="0">
+                <a:solidFill>
+                  <a:schemeClr val="bg1"/>
+                </a:solidFill>
+                <a:latin typeface="Verdana Regular"/>
+              </a:rPr>
+              <a:t>-Logic </a:t>
+            </a:r>
             <a:r>
               <a:rPr lang="en-US" b="0" i="1" u="none" strike="noStrike" dirty="0">
                 <a:solidFill>
-                  <a:srgbClr val="000000"/>
-                </a:solidFill>
-                <a:latin typeface="Verdana Regular"/>
-              </a:rPr>
-              <a:t> - </a:t>
-            </a:r>
-            <a:r>
-              <a:rPr lang="en-US" b="0" i="1" u="none" strike="noStrike" dirty="0" err="1">
-                <a:solidFill>
-                  <a:srgbClr val="000000"/>
-                </a:solidFill>
-                <a:latin typeface="Verdana Regular"/>
-              </a:rPr>
-              <a:t>AgBiz</a:t>
-            </a:r>
-            <a:r>
-              <a:rPr lang="en-US" b="0" i="1" u="none" strike="noStrike" dirty="0">
-                <a:solidFill>
-                  <a:srgbClr val="000000"/>
-                </a:solidFill>
-                <a:latin typeface="Verdana Regular"/>
-              </a:rPr>
-              <a:t>-Logic is</a:t>
+                  <a:schemeClr val="bg1"/>
+                </a:solidFill>
+                <a:latin typeface="Verdana Regular"/>
+              </a:rPr>
+              <a:t>is</a:t>
             </a:r>
             <a:r>
               <a:rPr lang="en-US" i="1" dirty="0">
                 <a:solidFill>
-                  <a:srgbClr val="000000"/>
+                  <a:schemeClr val="bg1"/>
                 </a:solidFill>
                 <a:latin typeface="Verdana Regular"/>
               </a:rPr>
@@ -2711,7 +2718,7 @@
             <a:r>
               <a:rPr lang="en-US" b="0" i="0" u="none" strike="noStrike" dirty="0">
                 <a:solidFill>
-                  <a:srgbClr val="000000"/>
+                  <a:schemeClr val="bg1"/>
                 </a:solidFill>
                 <a:latin typeface="Verdana Regular"/>
               </a:rPr>
@@ -2720,7 +2727,7 @@
             <a:r>
               <a:rPr lang="en-US" b="1" i="0" u="none" strike="noStrike" dirty="0">
                 <a:solidFill>
-                  <a:srgbClr val="000000"/>
+                  <a:schemeClr val="bg1"/>
                 </a:solidFill>
                 <a:latin typeface="Verdana Regular"/>
               </a:rPr>
@@ -2729,21 +2736,26 @@
             <a:r>
               <a:rPr lang="en-US" b="0" i="0" u="none" strike="noStrike" dirty="0">
                 <a:solidFill>
-                  <a:srgbClr val="000000"/>
+                  <a:schemeClr val="bg1"/>
                 </a:solidFill>
                 <a:latin typeface="Verdana Regular"/>
               </a:rPr>
               <a:t> for businesses that grow, harvest, package, add value, and sell agricultural products.</a:t>
             </a:r>
             <a:r>
-              <a:rPr lang="en-US" b="0" i="0" dirty="0">
+              <a:rPr lang="en-US" b="0" i="0" dirty="0" smtClean="0">
+                <a:solidFill>
+                  <a:schemeClr val="bg1"/>
+                </a:solidFill>
                 <a:latin typeface="Verdana Regular"/>
               </a:rPr>
               <a:t>​</a:t>
             </a:r>
-            <a:endParaRPr lang="en-US" b="0" i="0" dirty="0">
+            <a:endParaRPr lang="en-US" dirty="0">
+              <a:solidFill>
+                <a:schemeClr val="bg1"/>
+              </a:solidFill>
               <a:latin typeface="Verdana Regular"/>
-              <a:cs typeface="Calibri"/>
             </a:endParaRPr>
           </a:p>
           <a:p>
@@ -2751,6 +2763,9 @@
               <a:buNone/>
             </a:pPr>
             <a:endParaRPr lang="en-US" b="0" i="0" dirty="0">
+              <a:solidFill>
+                <a:schemeClr val="bg1"/>
+              </a:solidFill>
               <a:latin typeface="Verdana Regular"/>
               <a:cs typeface="Calibri"/>
             </a:endParaRPr>
@@ -2760,104 +2775,168 @@
             <a:r>
               <a:rPr lang="en-US" b="1" i="0" u="none" strike="noStrike" dirty="0">
                 <a:solidFill>
-                  <a:srgbClr val="000000"/>
-                </a:solidFill>
-                <a:latin typeface="Verdana Regular"/>
-              </a:rPr>
-              <a:t>Where does the  Financial Data come from?</a:t>
-            </a:r>
-            <a:r>
-              <a:rPr lang="en-US" b="0" i="0" dirty="0">
+                  <a:schemeClr val="bg1"/>
+                </a:solidFill>
+                <a:latin typeface="Verdana Regular"/>
+              </a:rPr>
+              <a:t>Where does the </a:t>
+            </a:r>
+            <a:r>
+              <a:rPr lang="en-US" b="1" i="0" u="none" strike="noStrike" dirty="0" smtClean="0">
+                <a:solidFill>
+                  <a:schemeClr val="bg1"/>
+                </a:solidFill>
+                <a:latin typeface="Verdana Regular"/>
+              </a:rPr>
+              <a:t>Financial </a:t>
+            </a:r>
+            <a:r>
+              <a:rPr lang="en-US" b="1" i="0" u="none" strike="noStrike" dirty="0">
+                <a:solidFill>
+                  <a:schemeClr val="bg1"/>
+                </a:solidFill>
+                <a:latin typeface="Verdana Regular"/>
+              </a:rPr>
+              <a:t>Data come from?</a:t>
+            </a:r>
+            <a:r>
+              <a:rPr lang="en-US" b="0" i="0" dirty="0" smtClean="0">
+                <a:solidFill>
+                  <a:schemeClr val="bg1"/>
+                </a:solidFill>
                 <a:latin typeface="Verdana Regular"/>
               </a:rPr>
               <a:t>​</a:t>
             </a:r>
-            <a:endParaRPr lang="en-US" b="0" i="0" dirty="0">
+            <a:endParaRPr lang="en-US" dirty="0">
+              <a:solidFill>
+                <a:schemeClr val="bg1"/>
+              </a:solidFill>
               <a:latin typeface="Verdana Regular"/>
-              <a:cs typeface="Calibri"/>
             </a:endParaRPr>
           </a:p>
           <a:p>
-            <a:pPr algn="l" rtl="0"/>
+            <a:pPr algn="l" rtl="0">
+              <a:buFontTx/>
+              <a:buChar char="-"/>
+            </a:pPr>
+            <a:r>
+              <a:rPr lang="en-US" b="0" i="1" u="none" strike="noStrike" dirty="0" err="1" smtClean="0">
+                <a:solidFill>
+                  <a:schemeClr val="bg1"/>
+                </a:solidFill>
+                <a:latin typeface="Verdana Regular"/>
+              </a:rPr>
+              <a:t>AgBiz</a:t>
+            </a:r>
+            <a:r>
+              <a:rPr lang="en-US" b="0" i="1" u="none" strike="noStrike" dirty="0" smtClean="0">
+                <a:solidFill>
+                  <a:schemeClr val="bg1"/>
+                </a:solidFill>
+                <a:latin typeface="Verdana Regular"/>
+              </a:rPr>
+              <a:t>-Logic</a:t>
+            </a:r>
+            <a:r>
+              <a:rPr lang="en-US" b="0" i="0" u="none" strike="noStrike" dirty="0" smtClean="0">
+                <a:solidFill>
+                  <a:schemeClr val="bg1"/>
+                </a:solidFill>
+                <a:latin typeface="Verdana Regular"/>
+              </a:rPr>
+              <a:t> </a:t>
+            </a:r>
             <a:r>
               <a:rPr lang="en-US" b="0" i="0" u="none" strike="noStrike" dirty="0">
                 <a:solidFill>
-                  <a:srgbClr val="000000"/>
-                </a:solidFill>
-                <a:latin typeface="Verdana Regular"/>
-              </a:rPr>
-              <a:t>- </a:t>
+                  <a:schemeClr val="bg1"/>
+                </a:solidFill>
+                <a:latin typeface="Verdana Regular"/>
+              </a:rPr>
+              <a:t>allows users to enter their own </a:t>
+            </a:r>
+            <a:r>
+              <a:rPr lang="en-US" b="0" i="0" u="none" strike="noStrike" dirty="0" smtClean="0">
+                <a:solidFill>
+                  <a:schemeClr val="bg1"/>
+                </a:solidFill>
+                <a:latin typeface="Verdana Regular"/>
+              </a:rPr>
+              <a:t> budgets </a:t>
+            </a:r>
+            <a:r>
+              <a:rPr lang="en-US" b="0" i="0" u="none" strike="noStrike" dirty="0">
+                <a:solidFill>
+                  <a:schemeClr val="bg1"/>
+                </a:solidFill>
+                <a:latin typeface="Verdana Regular"/>
+              </a:rPr>
+              <a:t>or selects University budgets for varying livestock and crops to plan for the future with </a:t>
             </a:r>
             <a:r>
               <a:rPr lang="en-US" b="0" i="0" u="none" strike="noStrike" dirty="0" err="1">
                 <a:solidFill>
-                  <a:srgbClr val="000000"/>
+                  <a:schemeClr val="bg1"/>
+                </a:solidFill>
+                <a:latin typeface="Verdana Regular"/>
+              </a:rPr>
+              <a:t>with</a:t>
+            </a:r>
+            <a:r>
+              <a:rPr lang="en-US" b="0" i="0" u="none" strike="noStrike" dirty="0">
+                <a:solidFill>
+                  <a:schemeClr val="bg1"/>
+                </a:solidFill>
+                <a:latin typeface="Verdana Regular"/>
+              </a:rPr>
+              <a:t> </a:t>
+            </a:r>
+            <a:r>
+              <a:rPr lang="en-US" b="0" i="1" u="none" strike="noStrike" dirty="0" err="1">
+                <a:solidFill>
+                  <a:schemeClr val="bg1"/>
                 </a:solidFill>
                 <a:latin typeface="Verdana Regular"/>
               </a:rPr>
               <a:t>AgBiz</a:t>
             </a:r>
             <a:r>
+              <a:rPr lang="en-US" b="0" i="1" u="none" strike="noStrike" dirty="0">
+                <a:solidFill>
+                  <a:schemeClr val="bg1"/>
+                </a:solidFill>
+                <a:latin typeface="Verdana Regular"/>
+              </a:rPr>
+              <a:t>-Logic</a:t>
+            </a:r>
+            <a:r>
               <a:rPr lang="en-US" b="0" i="0" u="none" strike="noStrike" dirty="0">
                 <a:solidFill>
-                  <a:srgbClr val="000000"/>
-                </a:solidFill>
-                <a:latin typeface="Verdana Regular"/>
-              </a:rPr>
-              <a:t>-Logic allows users to enter their own budgets or selects University budgets for varying livestock and crops to plan for the future with </a:t>
-            </a:r>
-            <a:r>
-              <a:rPr lang="en-US" b="0" i="0" u="none" strike="noStrike" dirty="0" err="1">
-                <a:solidFill>
-                  <a:srgbClr val="000000"/>
-                </a:solidFill>
-                <a:latin typeface="Verdana Regular"/>
-              </a:rPr>
-              <a:t>with</a:t>
-            </a:r>
-            <a:r>
-              <a:rPr lang="en-US" b="0" i="0" u="none" strike="noStrike" dirty="0">
-                <a:solidFill>
-                  <a:srgbClr val="000000"/>
-                </a:solidFill>
-                <a:latin typeface="Verdana Regular"/>
-              </a:rPr>
-              <a:t> </a:t>
-            </a:r>
-            <a:r>
-              <a:rPr lang="en-US" b="0" i="0" u="none" strike="noStrike" dirty="0" err="1">
-                <a:solidFill>
-                  <a:srgbClr val="000000"/>
-                </a:solidFill>
-                <a:latin typeface="Verdana Regular"/>
-              </a:rPr>
-              <a:t>AgBiz</a:t>
-            </a:r>
-            <a:r>
-              <a:rPr lang="en-US" b="0" i="0" u="none" strike="noStrike" dirty="0">
-                <a:solidFill>
-                  <a:srgbClr val="000000"/>
-                </a:solidFill>
-                <a:latin typeface="Verdana Regular"/>
-              </a:rPr>
-              <a:t>-Logic tools</a:t>
-            </a:r>
-            <a:r>
-              <a:rPr lang="en-US" b="0" i="0" dirty="0">
-                <a:latin typeface="Verdana Regular"/>
-              </a:rPr>
-              <a:t>​</a:t>
-            </a:r>
-            <a:endParaRPr lang="en-US" b="0" i="0" dirty="0">
-              <a:latin typeface="Verdana Regular"/>
-              <a:cs typeface="Calibri"/>
-            </a:endParaRPr>
+                  <a:schemeClr val="bg1"/>
+                </a:solidFill>
+                <a:latin typeface="Verdana Regular"/>
+              </a:rPr>
+              <a:t> tools</a:t>
+            </a:r>
+            <a:r>
+              <a:rPr lang="en-US" b="0" i="0" dirty="0" smtClean="0">
+                <a:solidFill>
+                  <a:schemeClr val="bg1"/>
+                </a:solidFill>
+                <a:latin typeface="Verdana Regular"/>
+              </a:rPr>
+              <a:t>​.</a:t>
+            </a:r>
           </a:p>
           <a:p>
             <a:pPr marL="0" indent="0" algn="l" rtl="0">
               <a:buNone/>
             </a:pPr>
             <a:endParaRPr lang="en-US" b="0" i="0" dirty="0">
+              <a:solidFill>
+                <a:schemeClr val="bg1"/>
+              </a:solidFill>
               <a:latin typeface="Verdana Regular"/>
               <a:cs typeface="Calibri"/>
             </a:endParaRPr>
@@ -2867,161 +2946,323 @@
             <a:r>
               <a:rPr lang="en-US" b="1" i="0" u="none" strike="noStrike" dirty="0">
                 <a:solidFill>
-                  <a:srgbClr val="000000"/>
+                  <a:schemeClr val="bg1"/>
                 </a:solidFill>
                 <a:latin typeface="Verdana Regular"/>
               </a:rPr>
               <a:t>What are the actual components that make up </a:t>
             </a:r>
             <a:r>
-              <a:rPr lang="en-US" b="1" i="0" u="none" strike="noStrike" dirty="0" err="1">
-                <a:solidFill>
-                  <a:srgbClr val="000000"/>
+              <a:rPr lang="en-US" b="1" i="1" u="none" strike="noStrike" dirty="0" err="1">
+                <a:solidFill>
+                  <a:schemeClr val="bg1"/>
                 </a:solidFill>
                 <a:latin typeface="Verdana Regular"/>
               </a:rPr>
               <a:t>AgBiz</a:t>
             </a:r>
             <a:r>
-              <a:rPr lang="en-US" b="1" i="0" u="none" strike="noStrike" dirty="0">
-                <a:solidFill>
-                  <a:srgbClr val="000000"/>
+              <a:rPr lang="en-US" b="1" i="1" u="none" strike="noStrike" dirty="0">
+                <a:solidFill>
+                  <a:schemeClr val="bg1"/>
                 </a:solidFill>
                 <a:latin typeface="Verdana Regular"/>
               </a:rPr>
               <a:t>-Logic</a:t>
             </a:r>
             <a:r>
-              <a:rPr lang="en-US" b="0" i="0" dirty="0">
+              <a:rPr lang="en-US" b="0" i="1" dirty="0" smtClean="0">
+                <a:solidFill>
+                  <a:schemeClr val="bg1"/>
+                </a:solidFill>
                 <a:latin typeface="Verdana Regular"/>
               </a:rPr>
               <a:t>​</a:t>
             </a:r>
-            <a:endParaRPr lang="en-US" b="0" i="0" dirty="0">
+            <a:r>
+              <a:rPr lang="en-US" b="0" i="0" dirty="0" smtClean="0">
+                <a:solidFill>
+                  <a:schemeClr val="bg1"/>
+                </a:solidFill>
+                <a:latin typeface="Verdana Regular"/>
+              </a:rPr>
+              <a:t>?</a:t>
+            </a:r>
+            <a:endParaRPr lang="en-US" dirty="0">
+              <a:solidFill>
+                <a:schemeClr val="bg1"/>
+              </a:solidFill>
               <a:latin typeface="Verdana Regular"/>
-              <a:cs typeface="Calibri"/>
             </a:endParaRPr>
           </a:p>
           <a:p>
-            <a:pPr algn="l" rtl="0"/>
+            <a:pPr algn="l" rtl="0">
+              <a:buFontTx/>
+              <a:buChar char="-"/>
+            </a:pPr>
+            <a:r>
+              <a:rPr lang="en-US" b="0" i="1" u="none" strike="noStrike" dirty="0" err="1" smtClean="0">
+                <a:solidFill>
+                  <a:schemeClr val="bg1"/>
+                </a:solidFill>
+                <a:latin typeface="Verdana Regular"/>
+              </a:rPr>
+              <a:t>AgBiz</a:t>
+            </a:r>
+            <a:r>
+              <a:rPr lang="en-US" b="0" i="1" u="none" strike="noStrike" dirty="0" smtClean="0">
+                <a:solidFill>
+                  <a:schemeClr val="bg1"/>
+                </a:solidFill>
+                <a:latin typeface="Verdana Regular"/>
+              </a:rPr>
+              <a:t>-Logic </a:t>
+            </a:r>
             <a:r>
               <a:rPr lang="en-US" b="0" i="0" u="none" strike="noStrike" dirty="0">
                 <a:solidFill>
-                  <a:srgbClr val="000000"/>
-                </a:solidFill>
-                <a:latin typeface="Verdana Regular"/>
-              </a:rPr>
-              <a:t>- </a:t>
-            </a:r>
-            <a:r>
-              <a:rPr lang="en-US" b="0" i="0" u="none" strike="noStrike" dirty="0" err="1">
-                <a:solidFill>
-                  <a:srgbClr val="000000"/>
+                  <a:schemeClr val="bg1"/>
+                </a:solidFill>
+                <a:latin typeface="Verdana Regular"/>
+              </a:rPr>
+              <a:t>consists of five distinct submodules including </a:t>
+            </a:r>
+            <a:r>
+              <a:rPr lang="en-US" b="0" i="1" u="none" strike="noStrike" dirty="0" err="1">
+                <a:solidFill>
+                  <a:schemeClr val="bg1"/>
+                </a:solidFill>
+                <a:latin typeface="Verdana Regular"/>
+              </a:rPr>
+              <a:t>AgBizProfit</a:t>
+            </a:r>
+            <a:r>
+              <a:rPr lang="en-US" b="0" i="0" u="none" strike="noStrike" dirty="0">
+                <a:solidFill>
+                  <a:schemeClr val="bg1"/>
+                </a:solidFill>
+                <a:latin typeface="Verdana Regular"/>
+              </a:rPr>
+              <a:t>, </a:t>
+            </a:r>
+            <a:r>
+              <a:rPr lang="en-US" b="0" i="1" u="none" strike="noStrike" dirty="0" err="1">
+                <a:solidFill>
+                  <a:schemeClr val="bg1"/>
+                </a:solidFill>
+                <a:latin typeface="Verdana Regular"/>
+              </a:rPr>
+              <a:t>AgBizLease</a:t>
+            </a:r>
+            <a:r>
+              <a:rPr lang="en-US" b="0" i="0" u="none" strike="noStrike" dirty="0">
+                <a:solidFill>
+                  <a:schemeClr val="bg1"/>
+                </a:solidFill>
+                <a:latin typeface="Verdana Regular"/>
+              </a:rPr>
+              <a:t>, </a:t>
+            </a:r>
+            <a:r>
+              <a:rPr lang="en-US" b="0" i="1" u="none" strike="noStrike" dirty="0" err="1">
+                <a:solidFill>
+                  <a:schemeClr val="bg1"/>
+                </a:solidFill>
+                <a:latin typeface="Verdana Regular"/>
+              </a:rPr>
+              <a:t>AgBizFi</a:t>
+            </a:r>
+            <a:r>
+              <a:rPr lang="en-US" b="0" i="1" u="none" strike="noStrike" dirty="0" err="1">
+                <a:solidFill>
+                  <a:schemeClr val="bg1"/>
+                </a:solidFill>
+                <a:latin typeface="Calibri"/>
+              </a:rPr>
+              <a:t>nance</a:t>
+            </a:r>
+            <a:r>
+              <a:rPr lang="en-US" b="0" i="0" u="none" strike="noStrike" dirty="0">
+                <a:solidFill>
+                  <a:schemeClr val="bg1"/>
+                </a:solidFill>
+                <a:latin typeface="Calibri"/>
+              </a:rPr>
+              <a:t>, </a:t>
+            </a:r>
+            <a:r>
+              <a:rPr lang="en-US" b="0" i="1" u="none" strike="noStrike" dirty="0" err="1">
+                <a:solidFill>
+                  <a:schemeClr val="bg1"/>
+                </a:solidFill>
+                <a:latin typeface="Calibri"/>
+              </a:rPr>
+              <a:t>AgBizEnvironment</a:t>
+            </a:r>
+            <a:r>
+              <a:rPr lang="en-US" b="0" i="0" u="none" strike="noStrike" dirty="0">
+                <a:solidFill>
+                  <a:schemeClr val="bg1"/>
+                </a:solidFill>
+                <a:latin typeface="Calibri"/>
+              </a:rPr>
+              <a:t>, and </a:t>
+            </a:r>
+            <a:r>
+              <a:rPr lang="en-US" b="0" i="1" u="none" strike="noStrike" dirty="0" err="1" smtClean="0">
+                <a:solidFill>
+                  <a:schemeClr val="bg1"/>
+                </a:solidFill>
+                <a:latin typeface="Calibri"/>
+              </a:rPr>
+              <a:t>AgBizClimate</a:t>
+            </a:r>
+            <a:r>
+              <a:rPr lang="en-US" b="0" i="0" u="none" strike="noStrike" dirty="0" smtClean="0">
+                <a:solidFill>
+                  <a:schemeClr val="bg1"/>
+                </a:solidFill>
+                <a:latin typeface="Calibri"/>
+              </a:rPr>
+              <a:t>.</a:t>
+            </a:r>
+          </a:p>
+          <a:p>
+            <a:pPr algn="l" rtl="0">
+              <a:buFontTx/>
+              <a:buChar char="-"/>
+            </a:pPr>
+            <a:endParaRPr lang="en-US" dirty="0">
+              <a:solidFill>
+                <a:schemeClr val="bg1"/>
+              </a:solidFill>
+              <a:latin typeface="Calibri"/>
+            </a:endParaRPr>
+          </a:p>
+          <a:p>
+            <a:r>
+              <a:rPr lang="en-US" b="1" dirty="0">
+                <a:solidFill>
+                  <a:schemeClr val="bg1"/>
+                </a:solidFill>
+                <a:latin typeface="Verdana Regular"/>
+              </a:rPr>
+              <a:t>What are </a:t>
+            </a:r>
+            <a:r>
+              <a:rPr lang="en-US" b="1" dirty="0" smtClean="0">
+                <a:solidFill>
+                  <a:schemeClr val="bg1"/>
+                </a:solidFill>
+                <a:latin typeface="Verdana Regular"/>
+              </a:rPr>
+              <a:t>the goals of </a:t>
+            </a:r>
+            <a:r>
+              <a:rPr lang="en-US" b="1" i="1" dirty="0" err="1" smtClean="0">
+                <a:solidFill>
+                  <a:schemeClr val="bg1"/>
                 </a:solidFill>
                 <a:latin typeface="Verdana Regular"/>
               </a:rPr>
               <a:t>AgBiz</a:t>
             </a:r>
             <a:r>
-              <a:rPr lang="en-US" b="0" i="0" u="none" strike="noStrike" dirty="0">
-                <a:solidFill>
-                  <a:srgbClr val="000000"/>
-                </a:solidFill>
-                <a:latin typeface="Verdana Regular"/>
-              </a:rPr>
-              <a:t>-Logic consists of five distinct submodules including </a:t>
-            </a:r>
-            <a:r>
-              <a:rPr lang="en-US" b="0" i="0" u="none" strike="noStrike" dirty="0" err="1">
-                <a:solidFill>
-                  <a:srgbClr val="000000"/>
-                </a:solidFill>
-                <a:latin typeface="Verdana Regular"/>
-              </a:rPr>
-              <a:t>AgBizProfit</a:t>
-            </a:r>
-            <a:r>
-              <a:rPr lang="en-US" b="0" i="0" u="none" strike="noStrike" dirty="0">
-                <a:solidFill>
-                  <a:srgbClr val="000000"/>
-                </a:solidFill>
-                <a:latin typeface="Verdana Regular"/>
-              </a:rPr>
-              <a:t>, </a:t>
-            </a:r>
-            <a:r>
-              <a:rPr lang="en-US" b="0" i="0" u="none" strike="noStrike" dirty="0" err="1">
-                <a:solidFill>
-                  <a:srgbClr val="000000"/>
-                </a:solidFill>
-                <a:latin typeface="Verdana Regular"/>
-              </a:rPr>
-              <a:t>AgBizLease</a:t>
-            </a:r>
-            <a:r>
-              <a:rPr lang="en-US" b="0" i="0" u="none" strike="noStrike" dirty="0">
-                <a:solidFill>
-                  <a:srgbClr val="000000"/>
-                </a:solidFill>
-                <a:latin typeface="Verdana Regular"/>
-              </a:rPr>
-              <a:t>, </a:t>
-            </a:r>
-            <a:r>
-              <a:rPr lang="en-US" b="0" i="0" u="none" strike="noStrike" dirty="0" err="1">
-                <a:solidFill>
-                  <a:srgbClr val="000000"/>
-                </a:solidFill>
-                <a:latin typeface="Verdana Regular"/>
-              </a:rPr>
-              <a:t>AgBizFi</a:t>
-            </a:r>
-            <a:r>
-              <a:rPr lang="en-US" b="0" i="0" u="none" strike="noStrike" dirty="0" err="1">
-                <a:solidFill>
-                  <a:srgbClr val="000000"/>
-                </a:solidFill>
-                <a:latin typeface="Calibri"/>
-              </a:rPr>
-              <a:t>nance</a:t>
-            </a:r>
-            <a:r>
-              <a:rPr lang="en-US" b="0" i="0" u="none" strike="noStrike" dirty="0">
-                <a:solidFill>
-                  <a:srgbClr val="000000"/>
-                </a:solidFill>
-                <a:latin typeface="Calibri"/>
-              </a:rPr>
-              <a:t>, </a:t>
-            </a:r>
-            <a:r>
-              <a:rPr lang="en-US" b="0" i="0" u="none" strike="noStrike" dirty="0" err="1">
-                <a:solidFill>
-                  <a:srgbClr val="000000"/>
-                </a:solidFill>
-                <a:latin typeface="Calibri"/>
-              </a:rPr>
-              <a:t>AgBizEnvironment</a:t>
-            </a:r>
-            <a:r>
-              <a:rPr lang="en-US" b="0" i="0" u="none" strike="noStrike" dirty="0">
-                <a:solidFill>
-                  <a:srgbClr val="000000"/>
-                </a:solidFill>
-                <a:latin typeface="Calibri"/>
-              </a:rPr>
-              <a:t>, and </a:t>
-            </a:r>
-            <a:r>
-              <a:rPr lang="en-US" b="0" i="0" u="none" strike="noStrike" dirty="0" err="1">
-                <a:solidFill>
-                  <a:srgbClr val="000000"/>
-                </a:solidFill>
-                <a:latin typeface="Calibri"/>
-              </a:rPr>
-              <a:t>AgBizClimate</a:t>
-            </a:r>
-            <a:endParaRPr lang="en-US" dirty="0"/>
+              <a:rPr lang="en-US" b="1" i="1" dirty="0" smtClean="0">
+                <a:solidFill>
+                  <a:schemeClr val="bg1"/>
+                </a:solidFill>
+                <a:latin typeface="Verdana Regular"/>
+              </a:rPr>
+              <a:t>-Logic</a:t>
+            </a:r>
+            <a:r>
+              <a:rPr lang="en-US" dirty="0" smtClean="0">
+                <a:solidFill>
+                  <a:schemeClr val="bg1"/>
+                </a:solidFill>
+                <a:latin typeface="Verdana Regular"/>
+              </a:rPr>
+              <a:t>?</a:t>
+            </a:r>
+          </a:p>
+          <a:p>
+            <a:pPr>
+              <a:buFontTx/>
+              <a:buChar char="-"/>
+            </a:pPr>
+            <a:r>
+              <a:rPr lang="en-US" i="1" dirty="0" err="1" smtClean="0">
+                <a:solidFill>
+                  <a:schemeClr val="bg1"/>
+                </a:solidFill>
+                <a:latin typeface="Verdana Regular"/>
+              </a:rPr>
+              <a:t>AgBiz</a:t>
+            </a:r>
+            <a:r>
+              <a:rPr lang="en-US" i="1" dirty="0" smtClean="0">
+                <a:solidFill>
+                  <a:schemeClr val="bg1"/>
+                </a:solidFill>
+                <a:latin typeface="Verdana Regular"/>
+              </a:rPr>
+              <a:t>-Logic </a:t>
+            </a:r>
+            <a:r>
+              <a:rPr lang="en-US" dirty="0" smtClean="0">
+                <a:solidFill>
+                  <a:schemeClr val="bg1"/>
+                </a:solidFill>
+                <a:latin typeface="Verdana Regular"/>
+              </a:rPr>
+              <a:t>seeks to assist farmers and ranchers by supplying them with short and long term weather data. Additionally, the data produced by these modules will be used by researches to </a:t>
+            </a:r>
+            <a:r>
+              <a:rPr lang="en-US" smtClean="0">
+                <a:solidFill>
+                  <a:schemeClr val="bg1"/>
+                </a:solidFill>
+                <a:latin typeface="Verdana Regular"/>
+              </a:rPr>
+              <a:t>sudy </a:t>
+            </a:r>
+            <a:r>
+              <a:rPr lang="en-US" dirty="0" smtClean="0">
+                <a:solidFill>
+                  <a:schemeClr val="bg1"/>
+                </a:solidFill>
+                <a:latin typeface="Verdana Regular"/>
+              </a:rPr>
+              <a:t>the effects of climate change on farming and </a:t>
+            </a:r>
+            <a:r>
+              <a:rPr lang="en-US" smtClean="0">
+                <a:solidFill>
+                  <a:schemeClr val="bg1"/>
+                </a:solidFill>
+                <a:latin typeface="Verdana Regular"/>
+              </a:rPr>
+              <a:t>ranching.</a:t>
+            </a:r>
+            <a:endParaRPr lang="en-US" dirty="0">
+              <a:solidFill>
+                <a:schemeClr val="bg1"/>
+              </a:solidFill>
+              <a:latin typeface="Verdana Regular"/>
+            </a:endParaRPr>
+          </a:p>
+          <a:p>
+            <a:pPr>
+              <a:buFontTx/>
+              <a:buChar char="-"/>
+            </a:pPr>
+            <a:endParaRPr lang="en-US" i="1" dirty="0">
+              <a:solidFill>
+                <a:schemeClr val="bg1"/>
+              </a:solidFill>
+              <a:latin typeface="Calibri"/>
+            </a:endParaRPr>
           </a:p>
         </p:txBody>
       </p:sp>
@@ -3042,7 +3283,7 @@
         <p:spPr>
           <a:xfrm>
             <a:off x="33432077" y="5082306"/>
-            <a:ext cx="9418320" cy="14280833"/>
+            <a:ext cx="9418320" cy="13419058"/>
           </a:xfrm>
           <a:prstGeom prst="rect">
             <a:avLst/>
@@ -3157,7 +3398,7 @@
               <a:t>This workflow assumes that the users is already logged on and authenticated via the </a:t>
             </a:r>
             <a:r>
-              <a:rPr lang="en-US" sz="2800" dirty="0" err="1">
+              <a:rPr lang="en-US" sz="2800" i="1" dirty="0" err="1">
                 <a:latin typeface="Verdana Regular"/>
                 <a:ea typeface="Verdana"/>
                 <a:cs typeface="Verdana"/>
@@ -3165,12 +3406,303 @@
               <a:t>AgBizLogic</a:t>
             </a:r>
             <a:r>
-              <a:rPr lang="en-US" sz="2800" dirty="0">
+              <a:rPr lang="en-US" sz="2800" i="1" dirty="0">
                 <a:latin typeface="Verdana Regular"/>
                 <a:ea typeface="Verdana"/>
                 <a:cs typeface="Verdana"/>
               </a:rPr>
-              <a:t> Module and has navigated to the Climate Manager.</a:t>
+              <a:t> </a:t>
+            </a:r>
+            <a:r>
+              <a:rPr lang="en-US" sz="2800" dirty="0">
+                <a:latin typeface="Verdana Regular"/>
+                <a:ea typeface="Verdana"/>
+                <a:cs typeface="Verdana"/>
+              </a:rPr>
+              <a:t>Module and </a:t>
+            </a:r>
+            <a:r>
+              <a:rPr lang="en-US" sz="2800" dirty="0" smtClean="0">
+                <a:latin typeface="Verdana Regular"/>
+                <a:ea typeface="Verdana"/>
+                <a:cs typeface="Verdana"/>
+              </a:rPr>
+              <a:t>has </a:t>
+            </a:r>
+            <a:r>
+              <a:rPr lang="en-US" sz="2800" dirty="0">
+                <a:latin typeface="Verdana Regular"/>
+                <a:ea typeface="Verdana"/>
+                <a:cs typeface="Verdana"/>
+              </a:rPr>
+              <a:t>navigated to the Climate Manager</a:t>
+            </a:r>
+            <a:r>
+              <a:rPr lang="en-US" sz="2800" dirty="0" smtClean="0">
+                <a:latin typeface="Verdana Regular"/>
+                <a:ea typeface="Verdana"/>
+                <a:cs typeface="Verdana"/>
+              </a:rPr>
+              <a:t>.</a:t>
+            </a:r>
+          </a:p>
+          <a:p>
+            <a:pPr marL="514350" indent="-514350">
+              <a:buFont typeface="+mj-lt"/>
+              <a:buAutoNum type="arabicPeriod"/>
+            </a:pPr>
+            <a:endParaRPr lang="en-US" sz="2800" dirty="0">
+              <a:latin typeface="Verdana Regular"/>
+              <a:ea typeface="Verdana"/>
+              <a:cs typeface="Verdana"/>
+            </a:endParaRPr>
+          </a:p>
+          <a:p>
+            <a:pPr marL="514350" indent="-514350">
+              <a:buAutoNum type="arabicPeriod"/>
+            </a:pPr>
+            <a:r>
+              <a:rPr lang="en-US" sz="2800" dirty="0">
+                <a:latin typeface="Verdana Regular"/>
+                <a:ea typeface="Verdana"/>
+                <a:cs typeface="Verdana"/>
+              </a:rPr>
+              <a:t>First, the user select the budgets that they want to analyze over the next 7 months.</a:t>
+            </a:r>
+          </a:p>
+          <a:p>
+            <a:pPr marL="514350" indent="-514350">
+              <a:buFont typeface="+mj-lt"/>
+              <a:buAutoNum type="arabicPeriod"/>
+            </a:pPr>
+            <a:endParaRPr lang="en-US" sz="3200" dirty="0">
+              <a:latin typeface="Verdana Regular"/>
+              <a:ea typeface="Verdana"/>
+              <a:cs typeface="Verdana"/>
+            </a:endParaRPr>
+          </a:p>
+          <a:p>
+            <a:pPr marL="514350" indent="-514350">
+              <a:buFont typeface="+mj-lt"/>
+              <a:buAutoNum type="arabicPeriod"/>
+            </a:pPr>
+            <a:r>
+              <a:rPr lang="en-US" sz="2800" dirty="0" smtClean="0">
+                <a:latin typeface="Verdana Regular"/>
+                <a:ea typeface="Verdana"/>
+                <a:cs typeface="Verdana"/>
+              </a:rPr>
+              <a:t>Then </a:t>
+            </a:r>
+            <a:r>
+              <a:rPr lang="en-US" sz="2800" dirty="0">
+                <a:latin typeface="Verdana Regular"/>
+                <a:ea typeface="Verdana"/>
+                <a:cs typeface="Verdana"/>
+              </a:rPr>
+              <a:t>t</a:t>
+            </a:r>
+            <a:r>
+              <a:rPr lang="en-US" sz="2800" dirty="0" smtClean="0">
+                <a:latin typeface="Verdana Regular"/>
+                <a:ea typeface="Verdana"/>
+                <a:cs typeface="Verdana"/>
+              </a:rPr>
+              <a:t>hey </a:t>
+            </a:r>
+            <a:r>
+              <a:rPr lang="en-US" sz="2800" dirty="0">
+                <a:latin typeface="Verdana Regular"/>
+                <a:ea typeface="Verdana"/>
+                <a:cs typeface="Verdana"/>
+              </a:rPr>
+              <a:t>will then be redirected to the </a:t>
+            </a:r>
+            <a:r>
+              <a:rPr lang="en-US" sz="2800" dirty="0" smtClean="0">
+                <a:latin typeface="Verdana Regular"/>
+                <a:ea typeface="Verdana"/>
+                <a:cs typeface="Verdana"/>
+              </a:rPr>
+              <a:t>region </a:t>
+            </a:r>
+            <a:r>
+              <a:rPr lang="en-US" sz="2800" dirty="0">
+                <a:latin typeface="Verdana Regular"/>
+                <a:ea typeface="Verdana"/>
+                <a:cs typeface="Verdana"/>
+              </a:rPr>
+              <a:t>selection page. At this page they will select the </a:t>
+            </a:r>
+            <a:r>
+              <a:rPr lang="en-US" sz="2800" dirty="0" smtClean="0">
+                <a:latin typeface="Verdana Regular"/>
+                <a:ea typeface="Verdana"/>
+                <a:cs typeface="Verdana"/>
+              </a:rPr>
+              <a:t>location by county</a:t>
+            </a:r>
+            <a:r>
+              <a:rPr lang="en-US" sz="2800" dirty="0" smtClean="0">
+                <a:latin typeface="Verdana Regular"/>
+                <a:ea typeface="Verdana"/>
+                <a:cs typeface="Verdana"/>
+              </a:rPr>
+              <a:t> state.</a:t>
+            </a:r>
+          </a:p>
+          <a:p>
+            <a:pPr marL="514350" indent="-514350">
+              <a:buFont typeface="+mj-lt"/>
+              <a:buAutoNum type="arabicPeriod"/>
+            </a:pPr>
+            <a:endParaRPr lang="en-US" sz="2800" dirty="0">
+              <a:latin typeface="Verdana Regular"/>
+              <a:ea typeface="Verdana"/>
+              <a:cs typeface="Verdana"/>
+            </a:endParaRPr>
+          </a:p>
+          <a:p>
+            <a:pPr marL="514350" indent="-514350">
+              <a:buFont typeface="+mj-lt"/>
+              <a:buAutoNum type="arabicPeriod"/>
+            </a:pPr>
+            <a:r>
+              <a:rPr lang="en-US" sz="2800" dirty="0" smtClean="0">
+                <a:latin typeface="Verdana Regular"/>
+                <a:ea typeface="Verdana"/>
+                <a:cs typeface="Verdana"/>
+              </a:rPr>
+              <a:t>Next</a:t>
+            </a:r>
+            <a:r>
+              <a:rPr lang="en-US" sz="2800" dirty="0">
+                <a:latin typeface="Verdana Regular"/>
+                <a:ea typeface="Verdana"/>
+                <a:cs typeface="Verdana"/>
+              </a:rPr>
+              <a:t>, The user selects the short term scenario type. </a:t>
+            </a:r>
+            <a:r>
+              <a:rPr lang="en-US" sz="2800" dirty="0" smtClean="0">
+                <a:latin typeface="Verdana Regular"/>
+                <a:ea typeface="Verdana"/>
+                <a:cs typeface="Verdana"/>
+              </a:rPr>
+              <a:t>Selecting </a:t>
+            </a:r>
+            <a:r>
+              <a:rPr lang="en-US" sz="2800" dirty="0">
+                <a:latin typeface="Verdana Regular"/>
+                <a:ea typeface="Verdana"/>
+                <a:cs typeface="Verdana"/>
+              </a:rPr>
+              <a:t>short term climate Scenario will redirect the user to the charts page where the climate data for their location will be shown on a graph. If the user </a:t>
+            </a:r>
+            <a:r>
+              <a:rPr lang="en-US" sz="2800" dirty="0" smtClean="0">
+                <a:latin typeface="Verdana Regular"/>
+                <a:ea typeface="Verdana"/>
+                <a:cs typeface="Verdana"/>
+              </a:rPr>
+              <a:t>selects </a:t>
+            </a:r>
+            <a:r>
+              <a:rPr lang="en-US" sz="2800" dirty="0">
+                <a:latin typeface="Verdana Regular"/>
+                <a:ea typeface="Verdana"/>
+                <a:cs typeface="Verdana"/>
+              </a:rPr>
+              <a:t>long term climate scenario the user will be redirected to a page where they will select which variables they would like to analyze.</a:t>
+            </a:r>
+          </a:p>
+          <a:p>
+            <a:pPr marL="514350" indent="-514350">
+              <a:buFont typeface="+mj-lt"/>
+              <a:buAutoNum type="arabicPeriod"/>
+            </a:pPr>
+            <a:endParaRPr lang="en-US" sz="2800" dirty="0">
+              <a:latin typeface="Verdana Regular"/>
+              <a:ea typeface="Verdana"/>
+              <a:cs typeface="Verdana"/>
+            </a:endParaRPr>
+          </a:p>
+          <a:p>
+            <a:pPr marL="514350" indent="-514350">
+              <a:buFont typeface="+mj-lt"/>
+              <a:buAutoNum type="arabicPeriod"/>
+            </a:pPr>
+            <a:r>
+              <a:rPr lang="en-US" sz="2800" dirty="0" smtClean="0">
+                <a:latin typeface="Verdana Regular"/>
+                <a:ea typeface="Verdana"/>
+                <a:cs typeface="Verdana"/>
+              </a:rPr>
+              <a:t>Next</a:t>
+            </a:r>
+            <a:r>
+              <a:rPr lang="en-US" sz="2800" dirty="0">
+                <a:latin typeface="Verdana Regular"/>
+                <a:ea typeface="Verdana"/>
+                <a:cs typeface="Verdana"/>
+              </a:rPr>
+              <a:t>, the user will be </a:t>
+            </a:r>
+            <a:r>
+              <a:rPr lang="en-US" sz="2800" dirty="0" smtClean="0">
+                <a:latin typeface="Verdana Regular"/>
+                <a:ea typeface="Verdana"/>
+                <a:cs typeface="Verdana"/>
+              </a:rPr>
+              <a:t>directed chart page </a:t>
+            </a:r>
+            <a:r>
+              <a:rPr lang="en-US" sz="2800" dirty="0">
+                <a:latin typeface="Verdana Regular"/>
+                <a:ea typeface="Verdana"/>
+                <a:cs typeface="Verdana"/>
+              </a:rPr>
+              <a:t>where they </a:t>
+            </a:r>
+            <a:r>
+              <a:rPr lang="en-US" sz="2800" dirty="0" smtClean="0">
+                <a:latin typeface="Verdana Regular"/>
+                <a:ea typeface="Verdana"/>
+                <a:cs typeface="Verdana"/>
+              </a:rPr>
+              <a:t>may</a:t>
+            </a:r>
+            <a:r>
+              <a:rPr lang="en-US" sz="2800" dirty="0" smtClean="0">
+                <a:latin typeface="Verdana Regular"/>
+                <a:ea typeface="Verdana"/>
+                <a:cs typeface="Verdana"/>
+              </a:rPr>
+              <a:t> </a:t>
+            </a:r>
+            <a:r>
+              <a:rPr lang="en-US" sz="2800" dirty="0">
+                <a:latin typeface="Verdana Regular"/>
+                <a:ea typeface="Verdana"/>
+                <a:cs typeface="Verdana"/>
+              </a:rPr>
+              <a:t>enter adjustments to the yield for each budget that they selected based on the climate </a:t>
+            </a:r>
+            <a:r>
+              <a:rPr lang="en-US" sz="2800" dirty="0" smtClean="0">
+                <a:latin typeface="Verdana Regular"/>
+                <a:ea typeface="Verdana"/>
+                <a:cs typeface="Verdana"/>
+              </a:rPr>
+              <a:t>variables shown</a:t>
+            </a:r>
+            <a:r>
+              <a:rPr lang="en-US" sz="2800" dirty="0">
+                <a:latin typeface="Verdana Regular"/>
+                <a:ea typeface="Verdana"/>
+                <a:cs typeface="Verdana"/>
+              </a:rPr>
+              <a:t>.</a:t>
             </a:r>
             <a:endParaRPr lang="en-US" sz="7250" dirty="0">
               <a:latin typeface="Verdana Regular"/>
@@ -3180,35 +3712,9 @@
           </a:p>
           <a:p>
             <a:pPr marL="514350" indent="-514350">
+              <a:buFont typeface="+mj-lt"/>
               <a:buAutoNum type="arabicPeriod"/>
             </a:pPr>
-            <a:r>
-              <a:rPr lang="en-US" sz="2800" dirty="0">
-                <a:latin typeface="Verdana Regular"/>
-                <a:ea typeface="Verdana"/>
-                <a:cs typeface="Verdana"/>
-              </a:rPr>
-              <a:t>First, the user select the budgets that they want to analyze over the next 7 months.</a:t>
-            </a:r>
-          </a:p>
-          <a:p>
-            <a:endParaRPr lang="en-US" sz="3200" dirty="0">
-              <a:latin typeface="Verdana Regular"/>
-              <a:ea typeface="Verdana"/>
-              <a:cs typeface="Verdana"/>
-            </a:endParaRPr>
-          </a:p>
-          <a:p>
-            <a:r>
-              <a:rPr lang="en-US" sz="2800" dirty="0">
-                <a:latin typeface="Verdana Regular"/>
-                <a:ea typeface="Verdana"/>
-                <a:cs typeface="Verdana"/>
-              </a:rPr>
-              <a:t>2. Then They will then be redirected to the Region selection page. At this page they will select the location their crop is located at by latitude and longitude.</a:t>
-            </a:r>
-          </a:p>
-          <a:p>
             <a:endParaRPr lang="en-US" sz="2800" dirty="0">
               <a:latin typeface="Verdana Regular"/>
               <a:ea typeface="Verdana"/>
@@ -3216,16 +3722,74 @@
             </a:endParaRPr>
           </a:p>
           <a:p>
-            <a:r>
-              <a:rPr lang="en-US" sz="2800" dirty="0">
+            <a:pPr marL="514350" indent="-514350">
+              <a:buFont typeface="+mj-lt"/>
+              <a:buAutoNum type="arabicPeriod"/>
+            </a:pPr>
+            <a:r>
+              <a:rPr lang="en-US" sz="2800" dirty="0" smtClean="0">
                 <a:latin typeface="Verdana Regular"/>
                 <a:ea typeface="Verdana"/>
                 <a:cs typeface="Verdana"/>
               </a:rPr>
-              <a:t>3. Next, The user selects the short term scenario type. Selecting A short term climate Scenario will redirect the user to the charts page where the climate data for their location will be shown on a graph. If the user selects a long term climate scenario the user will be redirected to a page where they will select which variables they would like to analyze.</a:t>
-            </a:r>
-          </a:p>
-          <a:p>
+              <a:t>The </a:t>
+            </a:r>
+            <a:r>
+              <a:rPr lang="en-US" sz="2800" dirty="0" smtClean="0">
+                <a:latin typeface="Verdana Regular"/>
+                <a:ea typeface="Verdana"/>
+                <a:cs typeface="Verdana"/>
+              </a:rPr>
+              <a:t>user </a:t>
+            </a:r>
+            <a:r>
+              <a:rPr lang="en-US" sz="2800" dirty="0">
+                <a:latin typeface="Verdana Regular"/>
+                <a:ea typeface="Verdana"/>
+                <a:cs typeface="Verdana"/>
+              </a:rPr>
+              <a:t>will then be directed to the budget page where </a:t>
+            </a:r>
+            <a:r>
+              <a:rPr lang="en-US" sz="2800" dirty="0" smtClean="0">
+                <a:latin typeface="Verdana Regular"/>
+                <a:ea typeface="Verdana"/>
+                <a:cs typeface="Verdana"/>
+              </a:rPr>
+              <a:t>adjustments </a:t>
+            </a:r>
+            <a:r>
+              <a:rPr lang="en-US" sz="2800" dirty="0">
+                <a:latin typeface="Verdana Regular"/>
+                <a:ea typeface="Verdana"/>
+                <a:cs typeface="Verdana"/>
+              </a:rPr>
+              <a:t>to prices, </a:t>
+            </a:r>
+            <a:r>
+              <a:rPr lang="en-US" sz="2800" dirty="0" smtClean="0">
+                <a:latin typeface="Verdana Regular"/>
+                <a:ea typeface="Verdana"/>
+                <a:cs typeface="Verdana"/>
+              </a:rPr>
+              <a:t>inputs, </a:t>
+            </a:r>
+            <a:r>
+              <a:rPr lang="en-US" sz="2800" dirty="0">
+                <a:latin typeface="Verdana Regular"/>
+                <a:ea typeface="Verdana"/>
+                <a:cs typeface="Verdana"/>
+              </a:rPr>
+              <a:t>and other budget </a:t>
+            </a:r>
+            <a:r>
+              <a:rPr lang="en-US" sz="2800" dirty="0" smtClean="0">
+                <a:latin typeface="Verdana Regular"/>
+                <a:ea typeface="Verdana"/>
+                <a:cs typeface="Verdana"/>
+              </a:rPr>
+              <a:t>parameters may be made for selected budgets.</a:t>
+            </a:r>
             <a:endParaRPr lang="en-US" sz="2800" dirty="0">
               <a:latin typeface="Verdana Regular"/>
               <a:ea typeface="Verdana"/>
@@ -3233,52 +3797,52 @@
             </a:endParaRPr>
           </a:p>
           <a:p>
-            <a:r>
-              <a:rPr lang="en-US" sz="2800" dirty="0">
-                <a:latin typeface="Verdana Regular"/>
-                <a:ea typeface="Verdana"/>
-                <a:cs typeface="Verdana"/>
-              </a:rPr>
-              <a:t>4. Next, the user will be directed to a page where they will enter adjustments to the yield for each budget that they selected based on the climate variables they were shown.</a:t>
-            </a:r>
-            <a:endParaRPr lang="en-US" sz="7250" dirty="0">
+            <a:pPr marL="514350" indent="-514350">
+              <a:buFont typeface="+mj-lt"/>
+              <a:buAutoNum type="arabicPeriod"/>
+            </a:pPr>
+            <a:endParaRPr lang="en-US" sz="2800" dirty="0" smtClean="0">
               <a:latin typeface="Verdana Regular"/>
               <a:ea typeface="Verdana"/>
               <a:cs typeface="Verdana"/>
             </a:endParaRPr>
           </a:p>
           <a:p>
-            <a:endParaRPr lang="en-US" sz="2800" dirty="0">
-              <a:latin typeface="Verdana Regular"/>
-              <a:ea typeface="Verdana"/>
-              <a:cs typeface="Verdana"/>
-            </a:endParaRPr>
-          </a:p>
-          <a:p>
-            <a:r>
-              <a:rPr lang="en-US" sz="2800" dirty="0">
+            <a:pPr marL="514350" indent="-514350">
+              <a:buFont typeface="+mj-lt"/>
+              <a:buAutoNum type="arabicPeriod"/>
+            </a:pPr>
+            <a:r>
+              <a:rPr lang="en-US" sz="2800" dirty="0" smtClean="0">
                 <a:latin typeface="Verdana Regular"/>
                 <a:ea typeface="Verdana"/>
                 <a:cs typeface="Verdana"/>
               </a:rPr>
-              <a:t>5. Then user will then be directed to the budget page where they can make adjustments to prices, inputs and other budget parameters. For the budgets they selected.</a:t>
-            </a:r>
-          </a:p>
-          <a:p>
-            <a:endParaRPr lang="en-US" sz="2800" dirty="0">
-              <a:latin typeface="Verdana Regular"/>
-              <a:ea typeface="Verdana"/>
-              <a:cs typeface="Verdana"/>
-            </a:endParaRPr>
-          </a:p>
-          <a:p>
+              <a:t>Finally </a:t>
+            </a:r>
             <a:r>
               <a:rPr lang="en-US" sz="2800" dirty="0">
                 <a:latin typeface="Verdana Regular"/>
                 <a:ea typeface="Verdana"/>
                 <a:cs typeface="Verdana"/>
               </a:rPr>
-              <a:t>6. Finally the user will be directed to a climate summary page summarizing how the climate projections will effect their budget.</a:t>
+              <a:t>the user will be directed to a climate summary page summarizing how the climate projections will </a:t>
+            </a:r>
+            <a:r>
+              <a:rPr lang="en-US" sz="2800" dirty="0" smtClean="0">
+                <a:latin typeface="Verdana Regular"/>
+                <a:ea typeface="Verdana"/>
+                <a:cs typeface="Verdana"/>
+              </a:rPr>
+              <a:t>affect </a:t>
+            </a:r>
+            <a:r>
+              <a:rPr lang="en-US" sz="2800" dirty="0">
+                <a:latin typeface="Verdana Regular"/>
+                <a:ea typeface="Verdana"/>
+                <a:cs typeface="Verdana"/>
+              </a:rPr>
+              <a:t>their budget.</a:t>
             </a:r>
             <a:endParaRPr lang="en-US" dirty="0">
               <a:latin typeface="Verdana Regular"/>
@@ -3303,7 +3867,7 @@
         <p:spPr>
           <a:xfrm>
             <a:off x="33432077" y="3746137"/>
-            <a:ext cx="8915400" cy="923330"/>
+            <a:ext cx="8915400" cy="830997"/>
           </a:xfrm>
           <a:prstGeom prst="rect">
             <a:avLst/>
@@ -3413,30 +3977,35 @@
           </a:lstStyle>
           <a:p>
             <a:r>
-              <a:rPr lang="en-US" sz="5400" dirty="0" err="1">
+              <a:rPr lang="en-US" sz="4800" i="1" dirty="0" err="1">
+                <a:solidFill>
+                  <a:schemeClr val="bg1"/>
+                </a:solidFill>
                 <a:latin typeface="Verdana Regular"/>
                 <a:cs typeface="Arial"/>
               </a:rPr>
               <a:t>AgBizClimate</a:t>
             </a:r>
             <a:r>
-              <a:rPr lang="en-US" sz="5400" dirty="0">
+              <a:rPr lang="en-US" sz="4800" dirty="0">
+                <a:solidFill>
+                  <a:schemeClr val="bg1"/>
+                </a:solidFill>
                 <a:latin typeface="Verdana Regular"/>
                 <a:cs typeface="Arial"/>
               </a:rPr>
               <a:t> Workflow</a:t>
             </a:r>
             <a:r>
-              <a:rPr lang="en-US" sz="5400" dirty="0">
+              <a:rPr lang="en-US" sz="4800" dirty="0">
+                <a:solidFill>
+                  <a:schemeClr val="bg1"/>
+                </a:solidFill>
                 <a:latin typeface="Arial"/>
                 <a:cs typeface="Arial"/>
               </a:rPr>
               <a:t> </a:t>
             </a:r>
-            <a:endParaRPr lang="en-US" dirty="0">
-              <a:latin typeface="Arial"/>
-              <a:cs typeface="Arial"/>
-            </a:endParaRPr>
           </a:p>
         </p:txBody>
       </p:sp>
@@ -3455,7 +4024,7 @@
         <p:spPr>
           <a:xfrm>
             <a:off x="12275820" y="3611880"/>
-            <a:ext cx="21945600" cy="1200329"/>
+            <a:ext cx="21945600" cy="2015936"/>
           </a:xfrm>
           <a:prstGeom prst="rect">
             <a:avLst/>
@@ -3471,12 +4040,37 @@
           <a:lstStyle/>
           <a:p>
             <a:r>
-              <a:rPr lang="en-US" dirty="0" err="1">
-                <a:latin typeface="Rufina-Stencil-Regular"/>
+              <a:rPr lang="en-US" sz="12500" i="1" dirty="0" err="1" smtClean="0">
+                <a:solidFill>
+                  <a:srgbClr val="DC4405"/>
+                </a:solidFill>
+                <a:latin typeface="Impact" panose="020B0806030902050204" pitchFamily="34" charset="0"/>
+              </a:rPr>
+              <a:t>AgBiz</a:t>
+            </a:r>
+            <a:r>
+              <a:rPr lang="en-US" sz="12500" i="1" dirty="0" smtClean="0">
+                <a:solidFill>
+                  <a:srgbClr val="DC4405"/>
+                </a:solidFill>
+                <a:latin typeface="Impact" panose="020B0806030902050204" pitchFamily="34" charset="0"/>
+              </a:rPr>
+              <a:t>-Logic: </a:t>
+            </a:r>
+            <a:r>
+              <a:rPr lang="en-US" sz="12500" i="1" dirty="0" err="1" smtClean="0">
+                <a:solidFill>
+                  <a:srgbClr val="DC4405"/>
+                </a:solidFill>
+                <a:latin typeface="Impact" panose="020B0806030902050204" pitchFamily="34" charset="0"/>
               </a:rPr>
               <a:t>AgBizClimate</a:t>
             </a:r>
-            <a:endParaRPr lang="en-US" dirty="0" err="1">
+            <a:endParaRPr lang="en-US" sz="12500" i="1" dirty="0">
+              <a:solidFill>
+                <a:srgbClr val="DC4405"/>
+              </a:solidFill>
+              <a:latin typeface="Impact" panose="020B0806030902050204" pitchFamily="34" charset="0"/>
               <a:cs typeface="Calibri"/>
             </a:endParaRPr>
           </a:p>
@@ -3497,7 +4091,7 @@
         <p:spPr>
           <a:xfrm>
             <a:off x="1410505" y="3797349"/>
-            <a:ext cx="8496299" cy="1209242"/>
+            <a:ext cx="8496299" cy="830997"/>
           </a:xfrm>
           <a:prstGeom prst="rect">
             <a:avLst/>
@@ -3608,122 +4202,34 @@
           <a:p>
             <a:pPr algn="ctr"/>
             <a:r>
-              <a:rPr lang="en-US" sz="7250" dirty="0" err="1">
-                <a:latin typeface="Verdana Regular"/>
-                <a:cs typeface="Calibri"/>
+              <a:rPr lang="en-US" sz="4800" i="1" dirty="0" err="1" smtClean="0">
+                <a:solidFill>
+                  <a:schemeClr val="bg1"/>
+                </a:solidFill>
+                <a:latin typeface="Verdana Regular"/>
+                <a:ea typeface="Verdana" panose="020B0604030504040204" pitchFamily="34" charset="0"/>
+                <a:cs typeface="Verdana" panose="020B0604030504040204" pitchFamily="34" charset="0"/>
               </a:rPr>
               <a:t>AgBiz</a:t>
             </a:r>
             <a:r>
-              <a:rPr lang="en-US" sz="7250" dirty="0">
-                <a:latin typeface="Verdana Regular"/>
-                <a:cs typeface="Calibri"/>
+              <a:rPr lang="en-US" sz="4800" i="1" dirty="0" smtClean="0">
+                <a:solidFill>
+                  <a:schemeClr val="bg1"/>
+                </a:solidFill>
+                <a:latin typeface="Verdana Regular"/>
+                <a:ea typeface="Verdana" panose="020B0604030504040204" pitchFamily="34" charset="0"/>
+                <a:cs typeface="Verdana" panose="020B0604030504040204" pitchFamily="34" charset="0"/>
               </a:rPr>
               <a:t>-Logic</a:t>
             </a:r>
-          </a:p>
-        </p:txBody>
-      </p:sp>
-      <p:sp>
-        <p:nvSpPr>
-          <p:cNvPr id="34" name="TextBox 33">
-            <a:extLst>
-              <a:ext uri="{FF2B5EF4-FFF2-40B4-BE49-F238E27FC236}">
-                <a16:creationId xmlns:a16="http://schemas.microsoft.com/office/drawing/2014/main" id="{25C08026-416A-4B80-BEFA-95276369E5B9}"/>
-              </a:ext>
-            </a:extLst>
-          </p:cNvPr>
-          <p:cNvSpPr txBox="1"/>
-          <p:nvPr/>
-        </p:nvSpPr>
-        <p:spPr>
-          <a:xfrm>
-            <a:off x="12275820" y="19865340"/>
-            <a:ext cx="19545298" cy="2708434"/>
-          </a:xfrm>
-          <a:prstGeom prst="rect">
-            <a:avLst/>
-          </a:prstGeom>
-        </p:spPr>
-        <p:txBody>
-          <a:bodyPr rot="0" spcFirstLastPara="0" vertOverflow="overflow" horzOverflow="overflow" vert="horz" wrap="square" lIns="91440" tIns="45720" rIns="91440" bIns="45720" numCol="1" spcCol="0" rtlCol="0" fromWordArt="0" anchor="t" anchorCtr="0" forceAA="0" compatLnSpc="1">
-            <a:prstTxWarp prst="textNoShape">
-              <a:avLst/>
-            </a:prstTxWarp>
-            <a:spAutoFit/>
-          </a:bodyPr>
-          <a:lstStyle/>
-          <a:p>
-            <a:r>
-              <a:rPr lang="en-US" sz="2000" dirty="0">
-                <a:latin typeface="Verdana Regular"/>
-              </a:rPr>
-              <a:t>On the left is a screenshot of one of the charts used in the </a:t>
-            </a:r>
-            <a:r>
-              <a:rPr lang="en-US" sz="2000" dirty="0" err="1">
-                <a:latin typeface="Verdana Regular"/>
-              </a:rPr>
-              <a:t>AgBizClimate</a:t>
-            </a:r>
-            <a:r>
-              <a:rPr lang="en-US" sz="2000" dirty="0">
-                <a:latin typeface="Verdana Regular"/>
-              </a:rPr>
-              <a:t> tool to help farmers forecast how climate may affect their crops.</a:t>
-            </a:r>
-          </a:p>
-          <a:p>
-            <a:endParaRPr lang="en-US" sz="2000" dirty="0">
+            <a:endParaRPr lang="en-US" sz="4800" i="1" dirty="0">
+              <a:solidFill>
+                <a:schemeClr val="bg1"/>
+              </a:solidFill>
               <a:latin typeface="Verdana Regular"/>
-            </a:endParaRPr>
-          </a:p>
-          <a:p>
-            <a:r>
-              <a:rPr lang="en-US" sz="2000" dirty="0">
-                <a:latin typeface="Verdana Regular"/>
-              </a:rPr>
-              <a:t>On the right is a use case diagram for the </a:t>
-            </a:r>
-            <a:r>
-              <a:rPr lang="en-US" sz="2000" dirty="0" err="1">
-                <a:latin typeface="Verdana Regular"/>
-              </a:rPr>
-              <a:t>AgBizClimate</a:t>
-            </a:r>
-            <a:r>
-              <a:rPr lang="en-US" sz="2000" dirty="0">
-                <a:latin typeface="Verdana Regular"/>
-              </a:rPr>
-              <a:t> tool. </a:t>
-            </a:r>
-            <a:endParaRPr lang="en-US" sz="2000" dirty="0">
-              <a:latin typeface="Verdana Regular"/>
-              <a:cs typeface="Calibri"/>
-            </a:endParaRPr>
-          </a:p>
-          <a:p>
-            <a:endParaRPr lang="en-US" sz="2000" dirty="0">
-              <a:latin typeface="Verdana Regular"/>
-              <a:cs typeface="Calibri"/>
-            </a:endParaRPr>
-          </a:p>
-          <a:p>
-            <a:r>
-              <a:rPr lang="en-US" sz="2000" dirty="0">
-                <a:latin typeface="Verdana Regular"/>
-              </a:rPr>
-              <a:t> </a:t>
-            </a:r>
-            <a:endParaRPr lang="en-US" sz="2000" dirty="0">
-              <a:latin typeface="Verdana Regular"/>
-              <a:cs typeface="Calibri"/>
-            </a:endParaRPr>
-          </a:p>
-          <a:p>
-            <a:pPr algn="ctr"/>
-            <a:endParaRPr lang="en-US" dirty="0">
-              <a:latin typeface="Georgia"/>
+              <a:ea typeface="Verdana" panose="020B0604030504040204" pitchFamily="34" charset="0"/>
+              <a:cs typeface="Verdana" panose="020B0604030504040204" pitchFamily="34" charset="0"/>
             </a:endParaRPr>
           </a:p>
         </p:txBody>
@@ -3745,7 +4251,7 @@
         <p:spPr>
           <a:xfrm>
             <a:off x="12279652" y="24394283"/>
-            <a:ext cx="8866230" cy="4739759"/>
+            <a:ext cx="8866230" cy="5601533"/>
           </a:xfrm>
           <a:prstGeom prst="rect">
             <a:avLst/>
@@ -3852,22 +4358,69 @@
           </a:lstStyle>
           <a:p>
             <a:r>
+              <a:rPr lang="en-US" sz="2800" dirty="0" smtClean="0">
+                <a:latin typeface="Kievit Offc" charset="0"/>
+                <a:ea typeface="Kievit Offc" charset="0"/>
+                <a:cs typeface="Kievit Offc" charset="0"/>
+              </a:rPr>
+              <a:t>Climate </a:t>
+            </a:r>
+            <a:r>
               <a:rPr lang="en-US" sz="2800" dirty="0">
                 <a:latin typeface="Kievit Offc" charset="0"/>
                 <a:ea typeface="Kievit Offc" charset="0"/>
                 <a:cs typeface="Kievit Offc" charset="0"/>
               </a:rPr>
-              <a:t> Climate change is a huge problem facing many farmers and ranchers. As the climate changes farmers will need to adapt and modify what they grow and how they grow it. To solve this problem will require intelligent data driven solutions.</a:t>
-            </a:r>
-          </a:p>
-          <a:p>
+              <a:t>change is a huge problem facing many farmers and ranchers. As the climate changes farmers will need to adapt and modify what they grow and how they grow it. To solve this problem will require intelligent data driven solutions</a:t>
+            </a:r>
+            <a:r>
+              <a:rPr lang="en-US" sz="2800" dirty="0" smtClean="0">
+                <a:latin typeface="Kievit Offc" charset="0"/>
+                <a:ea typeface="Kievit Offc" charset="0"/>
+                <a:cs typeface="Kievit Offc" charset="0"/>
+              </a:rPr>
+              <a:t>.</a:t>
+            </a:r>
+          </a:p>
+          <a:p>
+            <a:endParaRPr lang="en-US" sz="2800" dirty="0">
+              <a:latin typeface="Kievit Offc" charset="0"/>
+              <a:ea typeface="Kievit Offc" charset="0"/>
+              <a:cs typeface="Kievit Offc" charset="0"/>
+            </a:endParaRPr>
+          </a:p>
+          <a:p>
+            <a:r>
+              <a:rPr lang="en-US" sz="2800" dirty="0" smtClean="0">
+                <a:latin typeface="Kievit Offc" charset="0"/>
+                <a:ea typeface="Kievit Offc" charset="0"/>
+                <a:cs typeface="Kievit Offc" charset="0"/>
+              </a:rPr>
+              <a:t>This </a:t>
+            </a:r>
             <a:r>
               <a:rPr lang="en-US" sz="2800" dirty="0">
                 <a:latin typeface="Kievit Offc" charset="0"/>
                 <a:ea typeface="Kievit Offc" charset="0"/>
                 <a:cs typeface="Kievit Offc" charset="0"/>
               </a:rPr>
-              <a:t>     This project seeks to arm farmers and rancher with a suit of climate tools to help mitigate the effects of climate change. Currently there is already a long term climate tool that helps make longer term predictions. The focus of this project is providing seasonal guidance to farmers and ranches ultimately helping farmers to be more efficient and more profitable.</a:t>
+              <a:t>project seeks to arm farmers and rancher with a suit of climate tools to help mitigate the effects of climate change. Currently there is already a long term climate tool that helps make longer term predictions. The focus of this project is providing seasonal guidance to farmers and </a:t>
+            </a:r>
+            <a:r>
+              <a:rPr lang="en-US" sz="2800" dirty="0" smtClean="0">
+                <a:latin typeface="Kievit Offc" charset="0"/>
+                <a:ea typeface="Kievit Offc" charset="0"/>
+                <a:cs typeface="Kievit Offc" charset="0"/>
+              </a:rPr>
+              <a:t>ranches, </a:t>
+            </a:r>
+            <a:r>
+              <a:rPr lang="en-US" sz="2800" dirty="0">
+                <a:latin typeface="Kievit Offc" charset="0"/>
+                <a:ea typeface="Kievit Offc" charset="0"/>
+                <a:cs typeface="Kievit Offc" charset="0"/>
+              </a:rPr>
+              <a:t>ultimately helping farmers to be more efficient and more profitable.</a:t>
             </a:r>
           </a:p>
         </p:txBody>
@@ -3887,7 +4440,7 @@
         <p:spPr>
           <a:xfrm>
             <a:off x="22425660" y="24048719"/>
-            <a:ext cx="9395461" cy="8710077"/>
+            <a:ext cx="9395461" cy="6555641"/>
           </a:xfrm>
           <a:prstGeom prst="rect">
             <a:avLst/>
@@ -3902,15 +4455,30 @@
           </a:bodyPr>
           <a:lstStyle/>
           <a:p>
-            <a:pPr>
-              <a:buChar char="•"/>
+            <a:pPr marL="457200" indent="-457200">
+              <a:buFont typeface="Wingdings" panose="05000000000000000000" pitchFamily="2" charset="2"/>
+              <a:buChar char="§"/>
             </a:pPr>
             <a:r>
+              <a:rPr lang="en-US" sz="2800" dirty="0" smtClean="0">
+                <a:latin typeface="Verdana Regular"/>
+                <a:cs typeface="Arial"/>
+              </a:rPr>
+              <a:t>REST </a:t>
+            </a:r>
+            <a:r>
               <a:rPr lang="en-US" sz="2800" dirty="0">
                 <a:latin typeface="Verdana Regular"/>
                 <a:cs typeface="Arial"/>
               </a:rPr>
-              <a:t>REST API that provides the climate data for the short term projections.​</a:t>
+              <a:t>API that provides the climate data for the short term projections.</a:t>
+            </a:r>
+            <a:r>
+              <a:rPr lang="en-US" sz="2800" dirty="0" smtClean="0">
+                <a:latin typeface="Verdana Regular"/>
+                <a:cs typeface="Arial"/>
+              </a:rPr>
+              <a:t>​</a:t>
             </a:r>
             <a:endParaRPr lang="en-US" sz="2800" dirty="0">
               <a:latin typeface="Verdana Regular"/>
@@ -3918,15 +4486,43 @@
             </a:endParaRPr>
           </a:p>
           <a:p>
-            <a:pPr>
-              <a:buChar char="•"/>
+            <a:pPr marL="457200" indent="-457200">
+              <a:buFont typeface="Wingdings" panose="05000000000000000000" pitchFamily="2" charset="2"/>
+              <a:buChar char="§"/>
             </a:pPr>
             <a:r>
-              <a:rPr lang="en-US" sz="2800" dirty="0">
+              <a:rPr lang="en-US" sz="2800" dirty="0" smtClean="0">
                 <a:latin typeface="Verdana Regular"/>
                 <a:cs typeface="Arial"/>
               </a:rPr>
-              <a:t>This API Connects to a Database run by the University of Idaho .​</a:t>
+              <a:t>Data: Downscaled version of NOAA’s NMME dataset hosted by University Of Idah</a:t>
+            </a:r>
+            <a:r>
+              <a:rPr lang="en-US" sz="2800" dirty="0" smtClean="0">
+                <a:latin typeface="Verdana Regular"/>
+                <a:cs typeface="Arial"/>
+              </a:rPr>
+              <a:t>o.</a:t>
+            </a:r>
+          </a:p>
+          <a:p>
+            <a:pPr marL="457200" indent="-457200">
+              <a:buFont typeface="Wingdings" panose="05000000000000000000" pitchFamily="2" charset="2"/>
+              <a:buChar char="§"/>
+            </a:pPr>
+            <a:r>
+              <a:rPr lang="en-US" sz="2800" dirty="0" smtClean="0">
+                <a:latin typeface="Verdana Regular"/>
+                <a:cs typeface="Arial"/>
+              </a:rPr>
+              <a:t>Data files are stored on the production server. </a:t>
+            </a:r>
+            <a:r>
+              <a:rPr lang="en-US" sz="2800" dirty="0" smtClean="0">
+                <a:latin typeface="Verdana Regular"/>
+                <a:cs typeface="Arial"/>
+              </a:rPr>
+              <a:t>The production sever updates the data at the same date every month.</a:t>
             </a:r>
             <a:endParaRPr lang="en-US" sz="2800" dirty="0">
               <a:latin typeface="Verdana Regular"/>
@@ -3934,15 +4530,36 @@
             </a:endParaRPr>
           </a:p>
           <a:p>
-            <a:pPr marL="1842770" lvl="1">
-              <a:buChar char="•"/>
+            <a:pPr marL="457200" indent="-457200">
+              <a:buFont typeface="Wingdings" panose="05000000000000000000" pitchFamily="2" charset="2"/>
+              <a:buChar char="§"/>
             </a:pPr>
             <a:r>
+              <a:rPr lang="en-US" sz="2800" dirty="0" smtClean="0">
+                <a:latin typeface="Verdana Regular"/>
+                <a:cs typeface="Arial"/>
+              </a:rPr>
+              <a:t>API Connects Reads Data From the Production server via a Bind Mount to a directory on the production server. </a:t>
+            </a:r>
+          </a:p>
+          <a:p>
+            <a:pPr marL="457200" indent="-457200">
+              <a:buFont typeface="Wingdings" panose="05000000000000000000" pitchFamily="2" charset="2"/>
+              <a:buChar char="§"/>
+            </a:pPr>
+            <a:r>
+              <a:rPr lang="en-US" sz="2800" dirty="0" smtClean="0">
+                <a:latin typeface="Verdana Regular"/>
+                <a:cs typeface="Arial"/>
+              </a:rPr>
+              <a:t>API </a:t>
+            </a:r>
+            <a:r>
               <a:rPr lang="en-US" sz="2800" dirty="0">
                 <a:latin typeface="Verdana Regular"/>
                 <a:cs typeface="Arial"/>
               </a:rPr>
-              <a:t>This database  uses the NOAA’s NMME data set.​</a:t>
+              <a:t>Uses latitude and longitude to determine the users location. ​</a:t>
             </a:r>
             <a:endParaRPr lang="en-US" sz="2800" dirty="0">
               <a:latin typeface="Verdana Regular"/>
@@ -3950,93 +4567,37 @@
             </a:endParaRPr>
           </a:p>
           <a:p>
-            <a:pPr marL="1842770" lvl="1">
-              <a:buChar char="•"/>
+            <a:pPr marL="457200" indent="-457200">
+              <a:buFont typeface="Wingdings" panose="05000000000000000000" pitchFamily="2" charset="2"/>
+              <a:buChar char="§"/>
             </a:pPr>
             <a:r>
               <a:rPr lang="en-US" sz="2800" dirty="0">
                 <a:latin typeface="Verdana Regular"/>
                 <a:cs typeface="Arial"/>
               </a:rPr>
-              <a:t>This dataset includes 5 different models that provide short term climate forecasts.​</a:t>
-            </a:r>
-            <a:endParaRPr lang="en-US" sz="2800" dirty="0">
-              <a:latin typeface="Verdana Regular"/>
-              <a:cs typeface="Calibri"/>
-            </a:endParaRPr>
-          </a:p>
-          <a:p>
-            <a:pPr marL="1842770" lvl="1">
-              <a:buChar char="•"/>
-            </a:pPr>
+              <a:t>Gets the data for the nearest location within a radius of </a:t>
+            </a:r>
+            <a:r>
+              <a:rPr lang="en-US" sz="2800" dirty="0" smtClean="0">
+                <a:latin typeface="Verdana Regular"/>
+                <a:cs typeface="Arial"/>
+              </a:rPr>
+              <a:t>20</a:t>
+            </a:r>
+            <a:r>
+              <a:rPr lang="en-US" sz="2800" dirty="0" smtClean="0">
+                <a:latin typeface="Verdana Regular"/>
+                <a:cs typeface="Arial"/>
+              </a:rPr>
+              <a:t> </a:t>
+            </a:r>
             <a:r>
               <a:rPr lang="en-US" sz="2800" dirty="0">
                 <a:latin typeface="Verdana Regular"/>
                 <a:cs typeface="Arial"/>
               </a:rPr>
-              <a:t>Provides Forecasts for Temperature and Precipitation.​</a:t>
-            </a:r>
-            <a:endParaRPr lang="en-US" sz="2800" dirty="0">
-              <a:latin typeface="Verdana Regular"/>
-              <a:cs typeface="Calibri"/>
-            </a:endParaRPr>
-          </a:p>
-          <a:p>
-            <a:pPr>
-              <a:buChar char="•"/>
-            </a:pPr>
-            <a:r>
-              <a:rPr lang="en-US" sz="2800" dirty="0">
-                <a:latin typeface="Verdana Regular"/>
-                <a:cs typeface="Arial"/>
-              </a:rPr>
-              <a:t>API connects to Threads server using  the </a:t>
-            </a:r>
-            <a:r>
-              <a:rPr lang="en-US" sz="2800" dirty="0" err="1">
-                <a:latin typeface="Verdana Regular"/>
-                <a:cs typeface="Arial"/>
-              </a:rPr>
-              <a:t>OPeNDAP</a:t>
-            </a:r>
-            <a:r>
-              <a:rPr lang="en-US" sz="2800" dirty="0">
-                <a:latin typeface="Verdana Regular"/>
-                <a:cs typeface="Arial"/>
-              </a:rPr>
-              <a:t> protocol and reads NETCDF Files containing the relevant forecast data.​</a:t>
-            </a:r>
-            <a:endParaRPr lang="en-US" sz="2800" dirty="0">
-              <a:latin typeface="Verdana Regular"/>
-              <a:cs typeface="Calibri"/>
-            </a:endParaRPr>
-          </a:p>
-          <a:p>
-            <a:pPr>
-              <a:buChar char="•"/>
-            </a:pPr>
-            <a:r>
-              <a:rPr lang="en-US" sz="2800" dirty="0">
-                <a:latin typeface="Verdana Regular"/>
-                <a:cs typeface="Arial"/>
-              </a:rPr>
-              <a:t>API Uses latitude and longitude to determine the users location. ​</a:t>
-            </a:r>
-            <a:endParaRPr lang="en-US" sz="2800" dirty="0">
-              <a:latin typeface="Verdana Regular"/>
-              <a:cs typeface="Calibri"/>
-            </a:endParaRPr>
-          </a:p>
-          <a:p>
-            <a:pPr>
-              <a:buChar char="•"/>
-            </a:pPr>
-            <a:r>
-              <a:rPr lang="en-US" sz="2800" dirty="0">
-                <a:latin typeface="Verdana Regular"/>
-                <a:cs typeface="Arial"/>
-              </a:rPr>
-              <a:t>Gets the data for the nearest location within a radius of 16 miles if no data is available for a certain location.</a:t>
+              <a:t>miles if no data is available for a certain location.</a:t>
             </a:r>
             <a:endParaRPr lang="en-US" sz="2800" dirty="0">
               <a:latin typeface="Verdana Regular"/>
@@ -4082,40 +4643,106 @@
           <a:lstStyle/>
           <a:p>
             <a:r>
-              <a:rPr lang="en-US" sz="2800" err="1">
-                <a:latin typeface="Verdana Regular"/>
+              <a:rPr lang="en-US" sz="2800" i="1" dirty="0" err="1">
+                <a:latin typeface="Georgia" panose="02040502050405020303" pitchFamily="18" charset="0"/>
               </a:rPr>
               <a:t>AgBizClimate</a:t>
             </a:r>
             <a:r>
               <a:rPr lang="en-US" sz="2800" dirty="0">
-                <a:latin typeface="Verdana Regular"/>
+                <a:latin typeface="Georgia" panose="02040502050405020303" pitchFamily="18" charset="0"/>
               </a:rPr>
               <a:t> is a submodule of the </a:t>
             </a:r>
             <a:r>
-              <a:rPr lang="en-US" sz="2800" err="1">
-                <a:latin typeface="Verdana Regular"/>
+              <a:rPr lang="en-US" sz="2800" i="1" dirty="0" err="1">
+                <a:latin typeface="Georgia" panose="02040502050405020303" pitchFamily="18" charset="0"/>
               </a:rPr>
               <a:t>AgBiz</a:t>
             </a:r>
             <a:r>
+              <a:rPr lang="en-US" sz="2800" i="1" dirty="0">
+                <a:latin typeface="Georgia" panose="02040502050405020303" pitchFamily="18" charset="0"/>
+              </a:rPr>
+              <a:t>-Logic</a:t>
+            </a:r>
+            <a:r>
               <a:rPr lang="en-US" sz="2800" dirty="0">
-                <a:latin typeface="Verdana Regular"/>
-              </a:rPr>
-              <a:t>-Logic suite of decision tools. This submodule specializes in assisting farmers and ranchers by supplying them with short and long term weather data which they can use to make decisions on which direction to move their business. More specifically, </a:t>
-            </a:r>
-            <a:r>
-              <a:rPr lang="en-US" sz="2800" err="1">
-                <a:latin typeface="Verdana Regular"/>
+                <a:latin typeface="Georgia" panose="02040502050405020303" pitchFamily="18" charset="0"/>
+              </a:rPr>
+              <a:t> suite of decision tools. This submodule specializes in assisting farmers and ranchers by supplying them with short and long term weather data which they can use to make </a:t>
+            </a:r>
+            <a:r>
+              <a:rPr lang="en-US" sz="2800" dirty="0" smtClean="0">
+                <a:latin typeface="Georgia" panose="02040502050405020303" pitchFamily="18" charset="0"/>
+              </a:rPr>
+              <a:t>financial decisions</a:t>
+            </a:r>
+            <a:r>
+              <a:rPr lang="en-US" sz="2800" dirty="0" smtClean="0">
+                <a:latin typeface="Georgia" panose="02040502050405020303" pitchFamily="18" charset="0"/>
+              </a:rPr>
+              <a:t>. </a:t>
+            </a:r>
+            <a:r>
+              <a:rPr lang="en-US" sz="2800" dirty="0">
+                <a:latin typeface="Georgia" panose="02040502050405020303" pitchFamily="18" charset="0"/>
+              </a:rPr>
+              <a:t>More specifically, </a:t>
+            </a:r>
+            <a:r>
+              <a:rPr lang="en-US" sz="2800" i="1" dirty="0" err="1">
+                <a:latin typeface="Georgia" panose="02040502050405020303" pitchFamily="18" charset="0"/>
               </a:rPr>
               <a:t>AgBizClimate</a:t>
             </a:r>
             <a:r>
+              <a:rPr lang="en-US" sz="2800" i="1" dirty="0">
+                <a:latin typeface="Georgia" panose="02040502050405020303" pitchFamily="18" charset="0"/>
+              </a:rPr>
+              <a:t> </a:t>
+            </a:r>
+            <a:r>
               <a:rPr lang="en-US" sz="2800" dirty="0">
-                <a:latin typeface="Verdana Regular"/>
-              </a:rPr>
-              <a:t> provides precipitation and temperature information in a series of graphs associated to the location the users selected via latitude and longitude. Users are then able to input the percent they believe these factors will influence their yields then return calculations to assist their decisions.</a:t>
+                <a:latin typeface="Georgia" panose="02040502050405020303" pitchFamily="18" charset="0"/>
+              </a:rPr>
+              <a:t>provides precipitation and temperature information in a series of graphs associated to the location the users selected via latitude and longitude. Users are then able to input the percent they believe these factors will influence their yields </a:t>
+            </a:r>
+            <a:r>
+              <a:rPr lang="en-US" sz="2800" dirty="0" smtClean="0">
+                <a:latin typeface="Georgia" panose="02040502050405020303" pitchFamily="18" charset="0"/>
+              </a:rPr>
+              <a:t>, </a:t>
+            </a:r>
+            <a:r>
+              <a:rPr lang="en-US" sz="2800" i="1" dirty="0" err="1" smtClean="0">
+                <a:latin typeface="Georgia" panose="02040502050405020303" pitchFamily="18" charset="0"/>
+              </a:rPr>
+              <a:t>AgBizClimate</a:t>
+            </a:r>
+            <a:r>
+              <a:rPr lang="en-US" sz="2800" dirty="0" smtClean="0">
+                <a:latin typeface="Georgia" panose="02040502050405020303" pitchFamily="18" charset="0"/>
+              </a:rPr>
+              <a:t> will then </a:t>
+            </a:r>
+            <a:r>
+              <a:rPr lang="en-US" sz="2800" dirty="0">
+                <a:latin typeface="Georgia" panose="02040502050405020303" pitchFamily="18" charset="0"/>
+              </a:rPr>
+              <a:t>return </a:t>
+            </a:r>
+            <a:r>
+              <a:rPr lang="en-US" sz="2800" dirty="0" smtClean="0">
+                <a:latin typeface="Georgia" panose="02040502050405020303" pitchFamily="18" charset="0"/>
+              </a:rPr>
+              <a:t>the results of the calculations based on the users to </a:t>
+            </a:r>
+            <a:r>
+              <a:rPr lang="en-US" sz="2800" dirty="0">
+                <a:latin typeface="Georgia" panose="02040502050405020303" pitchFamily="18" charset="0"/>
+              </a:rPr>
+              <a:t>assist their decisions.</a:t>
             </a:r>
           </a:p>
         </p:txBody>
@@ -4207,7 +4834,7 @@
         </p:blipFill>
         <p:spPr>
           <a:xfrm>
-            <a:off x="1038586" y="20937133"/>
+            <a:off x="1022544" y="20929487"/>
             <a:ext cx="9706275" cy="5346331"/>
           </a:xfrm>
           <a:prstGeom prst="rect">
@@ -4237,7 +4864,7 @@
         </p:blipFill>
         <p:spPr>
           <a:xfrm>
-            <a:off x="22256926" y="10580803"/>
+            <a:off x="22256926" y="11712302"/>
             <a:ext cx="9553575" cy="6848475"/>
           </a:xfrm>
           <a:prstGeom prst="rect">
@@ -4245,6 +4872,122 @@
           </a:prstGeom>
         </p:spPr>
       </p:pic>
+      <p:sp>
+        <p:nvSpPr>
+          <p:cNvPr id="3" name="TextBox 2"/>
+          <p:cNvSpPr txBox="1"/>
+          <p:nvPr/>
+        </p:nvSpPr>
+        <p:spPr>
+          <a:xfrm>
+            <a:off x="12070081" y="18850117"/>
+            <a:ext cx="9134475" cy="1815882"/>
+          </a:xfrm>
+          <a:prstGeom prst="rect">
+            <a:avLst/>
+          </a:prstGeom>
+          <a:noFill/>
+        </p:spPr>
+        <p:txBody>
+          <a:bodyPr wrap="square" rtlCol="0">
+            <a:spAutoFit/>
+          </a:bodyPr>
+          <a:lstStyle/>
+          <a:p>
+            <a:r>
+              <a:rPr lang="en-US" sz="2800" b="1" dirty="0" smtClean="0">
+                <a:latin typeface="Verdana Regular"/>
+              </a:rPr>
+              <a:t>Figure 1: </a:t>
+            </a:r>
+            <a:r>
+              <a:rPr lang="en-US" sz="2800" dirty="0" smtClean="0">
+                <a:latin typeface="Verdana Regular"/>
+              </a:rPr>
+              <a:t>A screenshot of the </a:t>
+            </a:r>
+            <a:r>
+              <a:rPr lang="en-US" sz="2800" i="1" dirty="0" err="1" smtClean="0">
+                <a:latin typeface="Verdana Regular"/>
+              </a:rPr>
+              <a:t>AgBiz</a:t>
+            </a:r>
+            <a:r>
+              <a:rPr lang="en-US" sz="2800" i="1" dirty="0" smtClean="0">
+                <a:latin typeface="Verdana Regular"/>
+              </a:rPr>
+              <a:t>-Logic</a:t>
+            </a:r>
+            <a:r>
+              <a:rPr lang="en-US" sz="2800" dirty="0" smtClean="0">
+                <a:latin typeface="Verdana Regular"/>
+              </a:rPr>
+              <a:t> Short term Climate tool. This Screen Shot shows the plotting  tool where the user can make choices about their crop based on the plot.</a:t>
+            </a:r>
+            <a:endParaRPr lang="en-US" sz="2800" dirty="0">
+              <a:latin typeface="Verdana Regular"/>
+            </a:endParaRPr>
+          </a:p>
+        </p:txBody>
+      </p:sp>
+      <p:sp>
+        <p:nvSpPr>
+          <p:cNvPr id="5" name="TextBox 4"/>
+          <p:cNvSpPr txBox="1"/>
+          <p:nvPr/>
+        </p:nvSpPr>
+        <p:spPr>
+          <a:xfrm>
+            <a:off x="22064112" y="18850117"/>
+            <a:ext cx="9564196" cy="954107"/>
+          </a:xfrm>
+          <a:prstGeom prst="rect">
+            <a:avLst/>
+          </a:prstGeom>
+          <a:noFill/>
+        </p:spPr>
+        <p:txBody>
+          <a:bodyPr wrap="square" rtlCol="0">
+            <a:spAutoFit/>
+          </a:bodyPr>
+          <a:lstStyle/>
+          <a:p>
+            <a:r>
+              <a:rPr lang="en-US" sz="2800" b="1" dirty="0" smtClean="0">
+                <a:latin typeface="Verdana Regular"/>
+              </a:rPr>
+              <a:t>Figure 2: </a:t>
+            </a:r>
+            <a:r>
+              <a:rPr lang="en-US" sz="2800" dirty="0" smtClean="0">
+                <a:latin typeface="Verdana Regular"/>
+              </a:rPr>
+              <a:t>Shown Above is a use case diagram for the </a:t>
+            </a:r>
+            <a:r>
+              <a:rPr lang="en-US" sz="2800" i="1" dirty="0" err="1" smtClean="0">
+                <a:latin typeface="Verdana Regular"/>
+              </a:rPr>
+              <a:t>AgBizClimate</a:t>
+            </a:r>
+            <a:r>
+              <a:rPr lang="en-US" sz="2800" dirty="0">
+                <a:latin typeface="Verdana Regular"/>
+              </a:rPr>
+              <a:t> </a:t>
+            </a:r>
+            <a:r>
+              <a:rPr lang="en-US" sz="2800" dirty="0" smtClean="0">
+                <a:latin typeface="Verdana Regular"/>
+              </a:rPr>
+              <a:t>tool.</a:t>
+            </a:r>
+            <a:endParaRPr lang="en-US" sz="2800" b="1" dirty="0">
+              <a:latin typeface="Verdana Regular"/>
+            </a:endParaRPr>
+          </a:p>
+        </p:txBody>
+      </p:sp>
     </p:spTree>
     <p:extLst>
       <p:ext uri="{BB962C8B-B14F-4D97-AF65-F5344CB8AC3E}">
@@ -4255,6 +4998,13 @@
   <p:clrMapOvr>
     <a:masterClrMapping/>
   </p:clrMapOvr>
+  <p:timing>
+    <p:tnLst>
+      <p:par>
+        <p:cTn id="1" dur="indefinite" restart="never" nodeType="tmRoot"/>
+      </p:par>
+    </p:tnLst>
+  </p:timing>
 </p:sld>
 </file>
 

</xml_diff>

<commit_message>
Finished Final draft of expo poster
</commit_message>
<xml_diff>
--- a/ExpoPoster/fixedPosterRoughDraft.pptx
+++ b/ExpoPoster/fixedPosterRoughDraft.pptx
@@ -522,6 +522,91 @@
     </a:lvl9pPr>
   </p:notesStyle>
 </p:notesMaster>
+</file>
+
+<file path=ppt/notesSlides/notesSlide1.xml><?xml version="1.0" encoding="utf-8"?>
+<p:notes xmlns:a="http://schemas.openxmlformats.org/drawingml/2006/main" xmlns:r="http://schemas.openxmlformats.org/officeDocument/2006/relationships" xmlns:p="http://schemas.openxmlformats.org/presentationml/2006/main">
+  <p:cSld>
+    <p:spTree>
+      <p:nvGrpSpPr>
+        <p:cNvPr id="1" name=""/>
+        <p:cNvGrpSpPr/>
+        <p:nvPr/>
+      </p:nvGrpSpPr>
+      <p:grpSpPr>
+        <a:xfrm>
+          <a:off x="0" y="0"/>
+          <a:ext cx="0" cy="0"/>
+          <a:chOff x="0" y="0"/>
+          <a:chExt cx="0" cy="0"/>
+        </a:xfrm>
+      </p:grpSpPr>
+      <p:sp>
+        <p:nvSpPr>
+          <p:cNvPr id="2" name="Slide Image Placeholder 1"/>
+          <p:cNvSpPr>
+            <a:spLocks noGrp="1" noRot="1" noChangeAspect="1"/>
+          </p:cNvSpPr>
+          <p:nvPr>
+            <p:ph type="sldImg"/>
+          </p:nvPr>
+        </p:nvSpPr>
+        <p:spPr/>
+      </p:sp>
+      <p:sp>
+        <p:nvSpPr>
+          <p:cNvPr id="3" name="Notes Placeholder 2"/>
+          <p:cNvSpPr>
+            <a:spLocks noGrp="1"/>
+          </p:cNvSpPr>
+          <p:nvPr>
+            <p:ph type="body" idx="1"/>
+          </p:nvPr>
+        </p:nvSpPr>
+        <p:spPr/>
+        <p:txBody>
+          <a:bodyPr/>
+          <a:lstStyle/>
+          <a:p>
+            <a:endParaRPr lang="en-US" dirty="0"/>
+          </a:p>
+        </p:txBody>
+      </p:sp>
+      <p:sp>
+        <p:nvSpPr>
+          <p:cNvPr id="4" name="Slide Number Placeholder 3"/>
+          <p:cNvSpPr>
+            <a:spLocks noGrp="1"/>
+          </p:cNvSpPr>
+          <p:nvPr>
+            <p:ph type="sldNum" sz="quarter" idx="10"/>
+          </p:nvPr>
+        </p:nvSpPr>
+        <p:spPr/>
+        <p:txBody>
+          <a:bodyPr/>
+          <a:lstStyle/>
+          <a:p>
+            <a:fld id="{DD9D7D82-3AAB-FE4F-A8B8-55362074E59C}" type="slidenum">
+              <a:rPr lang="en-US" smtClean="0"/>
+              <a:pPr/>
+              <a:t>1</a:t>
+            </a:fld>
+            <a:endParaRPr lang="en-US" dirty="0"/>
+          </a:p>
+        </p:txBody>
+      </p:sp>
+    </p:spTree>
+    <p:extLst>
+      <p:ext uri="{BB962C8B-B14F-4D97-AF65-F5344CB8AC3E}">
+        <p14:creationId xmlns:p14="http://schemas.microsoft.com/office/powerpoint/2010/main" val="1018286887"/>
+      </p:ext>
+    </p:extLst>
+  </p:cSld>
+  <p:clrMapOvr>
+    <a:masterClrMapping/>
+  </p:clrMapOvr>
+</p:notes>
 </file>
 
 <file path=ppt/slideLayouts/slideLayout1.xml><?xml version="1.0" encoding="utf-8"?>
@@ -2454,7 +2539,7 @@
         <p:spPr>
           <a:xfrm>
             <a:off x="1780392" y="6217920"/>
-            <a:ext cx="8126412" cy="12900968"/>
+            <a:ext cx="8126412" cy="14630800"/>
           </a:xfrm>
           <a:prstGeom prst="rect">
             <a:avLst/>
@@ -2665,7 +2750,7 @@
               <a:t>-Logic?</a:t>
             </a:r>
             <a:r>
-              <a:rPr lang="en-US" b="0" i="0" dirty="0" smtClean="0">
+              <a:rPr lang="en-US" b="0" i="0" dirty="0">
                 <a:solidFill>
                   <a:schemeClr val="bg1"/>
                 </a:solidFill>
@@ -2680,7 +2765,7 @@
               <a:buChar char="-"/>
             </a:pPr>
             <a:r>
-              <a:rPr lang="en-US" b="0" i="1" u="none" strike="noStrike" dirty="0" err="1" smtClean="0">
+              <a:rPr lang="en-US" b="0" i="1" u="none" strike="noStrike" dirty="0" err="1">
                 <a:solidFill>
                   <a:schemeClr val="bg1"/>
                 </a:solidFill>
@@ -2689,22 +2774,13 @@
               <a:t>AgBiz</a:t>
             </a:r>
             <a:r>
-              <a:rPr lang="en-US" b="0" i="1" u="none" strike="noStrike" dirty="0" smtClean="0">
-                <a:solidFill>
-                  <a:schemeClr val="bg1"/>
-                </a:solidFill>
-                <a:latin typeface="Verdana Regular"/>
-              </a:rPr>
-              <a:t>-Logic </a:t>
-            </a:r>
-            <a:r>
               <a:rPr lang="en-US" b="0" i="1" u="none" strike="noStrike" dirty="0">
                 <a:solidFill>
                   <a:schemeClr val="bg1"/>
                 </a:solidFill>
                 <a:latin typeface="Verdana Regular"/>
               </a:rPr>
-              <a:t>is</a:t>
+              <a:t>-Logic is</a:t>
             </a:r>
             <a:r>
               <a:rPr lang="en-US" i="1" dirty="0">
@@ -2743,7 +2819,7 @@
               <a:t> for businesses that grow, harvest, package, add value, and sell agricultural products.</a:t>
             </a:r>
             <a:r>
-              <a:rPr lang="en-US" b="0" i="0" dirty="0" smtClean="0">
+              <a:rPr lang="en-US" b="0" i="0" dirty="0">
                 <a:solidFill>
                   <a:schemeClr val="bg1"/>
                 </a:solidFill>
@@ -2779,28 +2855,10 @@
                 </a:solidFill>
                 <a:latin typeface="Verdana Regular"/>
               </a:rPr>
-              <a:t>Where does the </a:t>
-            </a:r>
-            <a:r>
-              <a:rPr lang="en-US" b="1" i="0" u="none" strike="noStrike" dirty="0" smtClean="0">
-                <a:solidFill>
-                  <a:schemeClr val="bg1"/>
-                </a:solidFill>
-                <a:latin typeface="Verdana Regular"/>
-              </a:rPr>
-              <a:t>Financial </a:t>
-            </a:r>
-            <a:r>
-              <a:rPr lang="en-US" b="1" i="0" u="none" strike="noStrike" dirty="0">
-                <a:solidFill>
-                  <a:schemeClr val="bg1"/>
-                </a:solidFill>
-                <a:latin typeface="Verdana Regular"/>
-              </a:rPr>
-              <a:t>Data come from?</a:t>
-            </a:r>
-            <a:r>
-              <a:rPr lang="en-US" b="0" i="0" dirty="0" smtClean="0">
+              <a:t>Where does the Financial Data come from?</a:t>
+            </a:r>
+            <a:r>
+              <a:rPr lang="en-US" b="0" i="0" dirty="0">
                 <a:solidFill>
                   <a:schemeClr val="bg1"/>
                 </a:solidFill>
@@ -2821,7 +2879,7 @@
               <a:buChar char="-"/>
             </a:pPr>
             <a:r>
-              <a:rPr lang="en-US" b="0" i="1" u="none" strike="noStrike" dirty="0" err="1" smtClean="0">
+              <a:rPr lang="en-US" b="0" i="1" u="none" strike="noStrike" dirty="0" err="1">
                 <a:solidFill>
                   <a:schemeClr val="bg1"/>
                 </a:solidFill>
@@ -2830,7 +2888,7 @@
               <a:t>AgBiz</a:t>
             </a:r>
             <a:r>
-              <a:rPr lang="en-US" b="0" i="1" u="none" strike="noStrike" dirty="0" smtClean="0">
+              <a:rPr lang="en-US" b="0" i="1" u="none" strike="noStrike" dirty="0">
                 <a:solidFill>
                   <a:schemeClr val="bg1"/>
                 </a:solidFill>
@@ -2839,7 +2897,25 @@
               <a:t>-Logic</a:t>
             </a:r>
             <a:r>
-              <a:rPr lang="en-US" b="0" i="0" u="none" strike="noStrike" dirty="0" smtClean="0">
+              <a:rPr lang="en-US" b="0" i="0" u="none" strike="noStrike" dirty="0">
+                <a:solidFill>
+                  <a:schemeClr val="bg1"/>
+                </a:solidFill>
+                <a:latin typeface="Verdana Regular"/>
+              </a:rPr>
+              <a:t> allows users to enter their own  budgets or selects University budgets for varying livestock and crops to plan for the future with </a:t>
+            </a:r>
+            <a:r>
+              <a:rPr lang="en-US" b="0" i="0" u="none" strike="noStrike" dirty="0" err="1">
+                <a:solidFill>
+                  <a:schemeClr val="bg1"/>
+                </a:solidFill>
+                <a:latin typeface="Verdana Regular"/>
+              </a:rPr>
+              <a:t>with</a:t>
+            </a:r>
+            <a:r>
+              <a:rPr lang="en-US" b="0" i="0" u="none" strike="noStrike" dirty="0">
                 <a:solidFill>
                   <a:schemeClr val="bg1"/>
                 </a:solidFill>
@@ -2848,79 +2924,34 @@
               <a:t> </a:t>
             </a:r>
             <a:r>
+              <a:rPr lang="en-US" b="0" i="1" u="none" strike="noStrike" dirty="0" err="1">
+                <a:solidFill>
+                  <a:schemeClr val="bg1"/>
+                </a:solidFill>
+                <a:latin typeface="Verdana Regular"/>
+              </a:rPr>
+              <a:t>AgBiz</a:t>
+            </a:r>
+            <a:r>
+              <a:rPr lang="en-US" b="0" i="1" u="none" strike="noStrike" dirty="0">
+                <a:solidFill>
+                  <a:schemeClr val="bg1"/>
+                </a:solidFill>
+                <a:latin typeface="Verdana Regular"/>
+              </a:rPr>
+              <a:t>-Logic</a:t>
+            </a:r>
+            <a:r>
               <a:rPr lang="en-US" b="0" i="0" u="none" strike="noStrike" dirty="0">
                 <a:solidFill>
                   <a:schemeClr val="bg1"/>
                 </a:solidFill>
                 <a:latin typeface="Verdana Regular"/>
               </a:rPr>
-              <a:t>allows users to enter their own </a:t>
-            </a:r>
-            <a:r>
-              <a:rPr lang="en-US" b="0" i="0" u="none" strike="noStrike" dirty="0" smtClean="0">
-                <a:solidFill>
-                  <a:schemeClr val="bg1"/>
-                </a:solidFill>
-                <a:latin typeface="Verdana Regular"/>
-              </a:rPr>
-              <a:t> budgets </a:t>
-            </a:r>
-            <a:r>
-              <a:rPr lang="en-US" b="0" i="0" u="none" strike="noStrike" dirty="0">
-                <a:solidFill>
-                  <a:schemeClr val="bg1"/>
-                </a:solidFill>
-                <a:latin typeface="Verdana Regular"/>
-              </a:rPr>
-              <a:t>or selects University budgets for varying livestock and crops to plan for the future with </a:t>
-            </a:r>
-            <a:r>
-              <a:rPr lang="en-US" b="0" i="0" u="none" strike="noStrike" dirty="0" err="1">
-                <a:solidFill>
-                  <a:schemeClr val="bg1"/>
-                </a:solidFill>
-                <a:latin typeface="Verdana Regular"/>
-              </a:rPr>
-              <a:t>with</a:t>
-            </a:r>
-            <a:r>
-              <a:rPr lang="en-US" b="0" i="0" u="none" strike="noStrike" dirty="0">
-                <a:solidFill>
-                  <a:schemeClr val="bg1"/>
-                </a:solidFill>
-                <a:latin typeface="Verdana Regular"/>
-              </a:rPr>
-              <a:t> </a:t>
-            </a:r>
-            <a:r>
-              <a:rPr lang="en-US" b="0" i="1" u="none" strike="noStrike" dirty="0" err="1">
-                <a:solidFill>
-                  <a:schemeClr val="bg1"/>
-                </a:solidFill>
-                <a:latin typeface="Verdana Regular"/>
-              </a:rPr>
-              <a:t>AgBiz</a:t>
-            </a:r>
-            <a:r>
-              <a:rPr lang="en-US" b="0" i="1" u="none" strike="noStrike" dirty="0">
-                <a:solidFill>
-                  <a:schemeClr val="bg1"/>
-                </a:solidFill>
-                <a:latin typeface="Verdana Regular"/>
-              </a:rPr>
-              <a:t>-Logic</a:t>
-            </a:r>
-            <a:r>
-              <a:rPr lang="en-US" b="0" i="0" u="none" strike="noStrike" dirty="0">
-                <a:solidFill>
-                  <a:schemeClr val="bg1"/>
-                </a:solidFill>
-                <a:latin typeface="Verdana Regular"/>
-              </a:rPr>
               <a:t> tools</a:t>
             </a:r>
             <a:r>
-              <a:rPr lang="en-US" b="0" i="0" dirty="0" smtClean="0">
+              <a:rPr lang="en-US" b="0" i="0" dirty="0">
                 <a:solidFill>
                   <a:schemeClr val="bg1"/>
                 </a:solidFill>
@@ -2971,7 +3002,7 @@
               <a:t>-Logic</a:t>
             </a:r>
             <a:r>
-              <a:rPr lang="en-US" b="0" i="1" dirty="0" smtClean="0">
+              <a:rPr lang="en-US" b="0" i="1" dirty="0">
                 <a:solidFill>
                   <a:schemeClr val="bg1"/>
                 </a:solidFill>
@@ -2980,7 +3011,7 @@
               <a:t>​</a:t>
             </a:r>
             <a:r>
-              <a:rPr lang="en-US" b="0" i="0" dirty="0" smtClean="0">
+              <a:rPr lang="en-US" b="0" i="0" dirty="0">
                 <a:solidFill>
                   <a:schemeClr val="bg1"/>
                 </a:solidFill>
@@ -3001,7 +3032,7 @@
               <a:buChar char="-"/>
             </a:pPr>
             <a:r>
-              <a:rPr lang="en-US" b="0" i="1" u="none" strike="noStrike" dirty="0" err="1" smtClean="0">
+              <a:rPr lang="en-US" b="0" i="1" u="none" strike="noStrike" dirty="0" err="1">
                 <a:solidFill>
                   <a:schemeClr val="bg1"/>
                 </a:solidFill>
@@ -3010,7 +3041,7 @@
               <a:t>AgBiz</a:t>
             </a:r>
             <a:r>
-              <a:rPr lang="en-US" b="0" i="1" u="none" strike="noStrike" dirty="0" smtClean="0">
+              <a:rPr lang="en-US" b="0" i="1" u="none" strike="noStrike" dirty="0">
                 <a:solidFill>
                   <a:schemeClr val="bg1"/>
                 </a:solidFill>
@@ -3109,7 +3140,7 @@
               <a:t>, and </a:t>
             </a:r>
             <a:r>
-              <a:rPr lang="en-US" b="0" i="1" u="none" strike="noStrike" dirty="0" err="1" smtClean="0">
+              <a:rPr lang="en-US" b="0" i="1" u="none" strike="noStrike" dirty="0" err="1">
                 <a:solidFill>
                   <a:schemeClr val="bg1"/>
                 </a:solidFill>
@@ -3118,7 +3149,7 @@
               <a:t>AgBizClimate</a:t>
             </a:r>
             <a:r>
-              <a:rPr lang="en-US" b="0" i="0" u="none" strike="noStrike" dirty="0" smtClean="0">
+              <a:rPr lang="en-US" b="0" i="0" u="none" strike="noStrike" dirty="0">
                 <a:solidFill>
                   <a:schemeClr val="bg1"/>
                 </a:solidFill>
@@ -3147,19 +3178,10 @@
                 </a:solidFill>
                 <a:latin typeface="Verdana Regular"/>
               </a:rPr>
-              <a:t>What are </a:t>
-            </a:r>
-            <a:r>
-              <a:rPr lang="en-US" b="1" dirty="0" smtClean="0">
-                <a:solidFill>
-                  <a:schemeClr val="bg1"/>
-                </a:solidFill>
-                <a:latin typeface="Verdana Regular"/>
-              </a:rPr>
-              <a:t>the goals of </a:t>
-            </a:r>
-            <a:r>
-              <a:rPr lang="en-US" b="1" i="1" dirty="0" err="1" smtClean="0">
+              <a:t>What are the goals of </a:t>
+            </a:r>
+            <a:r>
+              <a:rPr lang="en-US" b="1" i="1" dirty="0" err="1">
                 <a:solidFill>
                   <a:schemeClr val="bg1"/>
                 </a:solidFill>
@@ -3168,7 +3190,7 @@
               <a:t>AgBiz</a:t>
             </a:r>
             <a:r>
-              <a:rPr lang="en-US" b="1" i="1" dirty="0" smtClean="0">
+              <a:rPr lang="en-US" b="1" i="1" dirty="0">
                 <a:solidFill>
                   <a:schemeClr val="bg1"/>
                 </a:solidFill>
@@ -3177,7 +3199,7 @@
               <a:t>-Logic</a:t>
             </a:r>
             <a:r>
-              <a:rPr lang="en-US" dirty="0" smtClean="0">
+              <a:rPr lang="en-US" dirty="0">
                 <a:solidFill>
                   <a:schemeClr val="bg1"/>
                 </a:solidFill>
@@ -3192,7 +3214,7 @@
               <a:buChar char="-"/>
             </a:pPr>
             <a:r>
-              <a:rPr lang="en-US" i="1" dirty="0" err="1" smtClean="0">
+              <a:rPr lang="en-US" i="1" dirty="0" err="1">
                 <a:solidFill>
                   <a:schemeClr val="bg1"/>
                 </a:solidFill>
@@ -3201,7 +3223,7 @@
               <a:t>AgBiz</a:t>
             </a:r>
             <a:r>
-              <a:rPr lang="en-US" i="1" dirty="0" smtClean="0">
+              <a:rPr lang="en-US" i="1" dirty="0">
                 <a:solidFill>
                   <a:schemeClr val="bg1"/>
                 </a:solidFill>
@@ -3210,47 +3232,14 @@
               <a:t>-Logic </a:t>
             </a:r>
             <a:r>
-              <a:rPr lang="en-US" dirty="0" smtClean="0">
-                <a:solidFill>
-                  <a:schemeClr val="bg1"/>
-                </a:solidFill>
-                <a:latin typeface="Verdana Regular"/>
-              </a:rPr>
-              <a:t>seeks to assist farmers and ranchers by supplying them with short and long term weather data. Additionally, the data produced by these modules will be used by researches to </a:t>
-            </a:r>
-            <a:r>
-              <a:rPr lang="en-US" smtClean="0">
-                <a:solidFill>
-                  <a:schemeClr val="bg1"/>
-                </a:solidFill>
-                <a:latin typeface="Verdana Regular"/>
-              </a:rPr>
-              <a:t>sudy </a:t>
-            </a:r>
-            <a:r>
-              <a:rPr lang="en-US" dirty="0" smtClean="0">
-                <a:solidFill>
-                  <a:schemeClr val="bg1"/>
-                </a:solidFill>
-                <a:latin typeface="Verdana Regular"/>
-              </a:rPr>
-              <a:t>the effects of climate change on farming and </a:t>
-            </a:r>
-            <a:r>
-              <a:rPr lang="en-US" smtClean="0">
-                <a:solidFill>
-                  <a:schemeClr val="bg1"/>
-                </a:solidFill>
-                <a:latin typeface="Verdana Regular"/>
-              </a:rPr>
-              <a:t>ranching.</a:t>
-            </a:r>
-            <a:endParaRPr lang="en-US" dirty="0">
-              <a:solidFill>
-                <a:schemeClr val="bg1"/>
-              </a:solidFill>
-              <a:latin typeface="Verdana Regular"/>
-            </a:endParaRPr>
+              <a:rPr lang="en-US" dirty="0">
+                <a:solidFill>
+                  <a:schemeClr val="bg1"/>
+                </a:solidFill>
+                <a:latin typeface="Verdana Regular"/>
+              </a:rPr>
+              <a:t>seeks to assist farmers and ranchers by supplying them with management tools. Additionally, the data produced by these modules will be used by researches to study the effects of climate change on farming and ranching.</a:t>
+            </a:r>
           </a:p>
           <a:p>
             <a:pPr>
@@ -3419,31 +3408,7 @@
                 <a:ea typeface="Verdana"/>
                 <a:cs typeface="Verdana"/>
               </a:rPr>
-              <a:t>Module and </a:t>
-            </a:r>
-            <a:r>
-              <a:rPr lang="en-US" sz="2800" dirty="0" smtClean="0">
-                <a:latin typeface="Verdana Regular"/>
-                <a:ea typeface="Verdana"/>
-                <a:cs typeface="Verdana"/>
-              </a:rPr>
-              <a:t>has </a:t>
-            </a:r>
-            <a:r>
-              <a:rPr lang="en-US" sz="2800" dirty="0">
-                <a:latin typeface="Verdana Regular"/>
-                <a:ea typeface="Verdana"/>
-                <a:cs typeface="Verdana"/>
-              </a:rPr>
-              <a:t>navigated to the Climate Manager</a:t>
-            </a:r>
-            <a:r>
-              <a:rPr lang="en-US" sz="2800" dirty="0" smtClean="0">
-                <a:latin typeface="Verdana Regular"/>
-                <a:ea typeface="Verdana"/>
-                <a:cs typeface="Verdana"/>
-              </a:rPr>
-              <a:t>.</a:t>
+              <a:t>Module and has navigated to the Climate Manager.</a:t>
             </a:r>
           </a:p>
           <a:p>
@@ -3487,68 +3452,12 @@
               <a:buAutoNum type="arabicPeriod"/>
             </a:pPr>
             <a:r>
-              <a:rPr lang="en-US" sz="2800" dirty="0" smtClean="0">
+              <a:rPr lang="en-US" sz="2800" dirty="0">
                 <a:latin typeface="Verdana Regular"/>
                 <a:ea typeface="Verdana"/>
                 <a:cs typeface="Verdana"/>
               </a:rPr>
-              <a:t>Then </a:t>
-            </a:r>
-            <a:r>
-              <a:rPr lang="en-US" sz="2800" dirty="0">
-                <a:latin typeface="Verdana Regular"/>
-                <a:ea typeface="Verdana"/>
-                <a:cs typeface="Verdana"/>
-              </a:rPr>
-              <a:t>t</a:t>
-            </a:r>
-            <a:r>
-              <a:rPr lang="en-US" sz="2800" dirty="0" smtClean="0">
-                <a:latin typeface="Verdana Regular"/>
-                <a:ea typeface="Verdana"/>
-                <a:cs typeface="Verdana"/>
-              </a:rPr>
-              <a:t>hey </a:t>
-            </a:r>
-            <a:r>
-              <a:rPr lang="en-US" sz="2800" dirty="0">
-                <a:latin typeface="Verdana Regular"/>
-                <a:ea typeface="Verdana"/>
-                <a:cs typeface="Verdana"/>
-              </a:rPr>
-              <a:t>will then be redirected to the </a:t>
-            </a:r>
-            <a:r>
-              <a:rPr lang="en-US" sz="2800" dirty="0" smtClean="0">
-                <a:latin typeface="Verdana Regular"/>
-                <a:ea typeface="Verdana"/>
-                <a:cs typeface="Verdana"/>
-              </a:rPr>
-              <a:t>region </a:t>
-            </a:r>
-            <a:r>
-              <a:rPr lang="en-US" sz="2800" dirty="0">
-                <a:latin typeface="Verdana Regular"/>
-                <a:ea typeface="Verdana"/>
-                <a:cs typeface="Verdana"/>
-              </a:rPr>
-              <a:t>selection page. At this page they will select the </a:t>
-            </a:r>
-            <a:r>
-              <a:rPr lang="en-US" sz="2800" dirty="0" smtClean="0">
-                <a:latin typeface="Verdana Regular"/>
-                <a:ea typeface="Verdana"/>
-                <a:cs typeface="Verdana"/>
-              </a:rPr>
-              <a:t>location by county</a:t>
-            </a:r>
-            <a:r>
-              <a:rPr lang="en-US" sz="2800" dirty="0" smtClean="0">
-                <a:latin typeface="Verdana Regular"/>
-                <a:ea typeface="Verdana"/>
-                <a:cs typeface="Verdana"/>
-              </a:rPr>
-              <a:t> state.</a:t>
+              <a:t>Then they will then be redirected to the region selection page. At this page they will select the location by county state.</a:t>
             </a:r>
           </a:p>
           <a:p>
@@ -3568,52 +3477,12 @@
               <a:buAutoNum type="arabicPeriod"/>
             </a:pPr>
             <a:r>
-              <a:rPr lang="en-US" sz="2800" dirty="0" smtClean="0">
+              <a:rPr lang="en-US" sz="2800" dirty="0">
                 <a:latin typeface="Verdana Regular"/>
                 <a:ea typeface="Verdana"/>
                 <a:cs typeface="Verdana"/>
               </a:rPr>
-              <a:t>Next</a:t>
-            </a:r>
-            <a:r>
-              <a:rPr lang="en-US" sz="2800" dirty="0">
-                <a:latin typeface="Verdana Regular"/>
-                <a:ea typeface="Verdana"/>
-                <a:cs typeface="Verdana"/>
-              </a:rPr>
-              <a:t>, The user selects the short term scenario type. </a:t>
-            </a:r>
-            <a:r>
-              <a:rPr lang="en-US" sz="2800" dirty="0" smtClean="0">
-                <a:latin typeface="Verdana Regular"/>
-                <a:ea typeface="Verdana"/>
-                <a:cs typeface="Verdana"/>
-              </a:rPr>
-              <a:t>Selecting </a:t>
-            </a:r>
-            <a:r>
-              <a:rPr lang="en-US" sz="2800" dirty="0">
-                <a:latin typeface="Verdana Regular"/>
-                <a:ea typeface="Verdana"/>
-                <a:cs typeface="Verdana"/>
-              </a:rPr>
-              <a:t>short term climate Scenario will redirect the user to the charts page where the climate data for their location will be shown on a graph. If the user </a:t>
-            </a:r>
-            <a:r>
-              <a:rPr lang="en-US" sz="2800" dirty="0" smtClean="0">
-                <a:latin typeface="Verdana Regular"/>
-                <a:ea typeface="Verdana"/>
-                <a:cs typeface="Verdana"/>
-              </a:rPr>
-              <a:t>selects </a:t>
-            </a:r>
-            <a:r>
-              <a:rPr lang="en-US" sz="2800" dirty="0">
-                <a:latin typeface="Verdana Regular"/>
-                <a:ea typeface="Verdana"/>
-                <a:cs typeface="Verdana"/>
-              </a:rPr>
-              <a:t>long term climate scenario the user will be redirected to a page where they will select which variables they would like to analyze.</a:t>
+              <a:t>Next, The user selects the short term scenario type. Selecting short term climate Scenario will redirect the user to the charts page where the climate data for their location will be shown on a graph. If the user selects long term climate scenario the user will be redirected to a page where they will select which variables they would like to analyze.</a:t>
             </a:r>
           </a:p>
           <a:p>
@@ -3633,76 +3502,12 @@
               <a:buAutoNum type="arabicPeriod"/>
             </a:pPr>
             <a:r>
-              <a:rPr lang="en-US" sz="2800" dirty="0" smtClean="0">
+              <a:rPr lang="en-US" sz="2800" dirty="0">
                 <a:latin typeface="Verdana Regular"/>
                 <a:ea typeface="Verdana"/>
                 <a:cs typeface="Verdana"/>
               </a:rPr>
-              <a:t>Next</a:t>
-            </a:r>
-            <a:r>
-              <a:rPr lang="en-US" sz="2800" dirty="0">
-                <a:latin typeface="Verdana Regular"/>
-                <a:ea typeface="Verdana"/>
-                <a:cs typeface="Verdana"/>
-              </a:rPr>
-              <a:t>, the user will be </a:t>
-            </a:r>
-            <a:r>
-              <a:rPr lang="en-US" sz="2800" dirty="0" smtClean="0">
-                <a:latin typeface="Verdana Regular"/>
-                <a:ea typeface="Verdana"/>
-                <a:cs typeface="Verdana"/>
-              </a:rPr>
-              <a:t>directed chart page </a:t>
-            </a:r>
-            <a:r>
-              <a:rPr lang="en-US" sz="2800" dirty="0">
-                <a:latin typeface="Verdana Regular"/>
-                <a:ea typeface="Verdana"/>
-                <a:cs typeface="Verdana"/>
-              </a:rPr>
-              <a:t>where they </a:t>
-            </a:r>
-            <a:r>
-              <a:rPr lang="en-US" sz="2800" dirty="0" smtClean="0">
-                <a:latin typeface="Verdana Regular"/>
-                <a:ea typeface="Verdana"/>
-                <a:cs typeface="Verdana"/>
-              </a:rPr>
-              <a:t>may</a:t>
-            </a:r>
-            <a:r>
-              <a:rPr lang="en-US" sz="2800" dirty="0" smtClean="0">
-                <a:latin typeface="Verdana Regular"/>
-                <a:ea typeface="Verdana"/>
-                <a:cs typeface="Verdana"/>
-              </a:rPr>
-              <a:t> </a:t>
-            </a:r>
-            <a:r>
-              <a:rPr lang="en-US" sz="2800" dirty="0">
-                <a:latin typeface="Verdana Regular"/>
-                <a:ea typeface="Verdana"/>
-                <a:cs typeface="Verdana"/>
-              </a:rPr>
-              <a:t>enter adjustments to the yield for each budget that they selected based on the climate </a:t>
-            </a:r>
-            <a:r>
-              <a:rPr lang="en-US" sz="2800" dirty="0" smtClean="0">
-                <a:latin typeface="Verdana Regular"/>
-                <a:ea typeface="Verdana"/>
-                <a:cs typeface="Verdana"/>
-              </a:rPr>
-              <a:t>variables shown</a:t>
-            </a:r>
-            <a:r>
-              <a:rPr lang="en-US" sz="2800" dirty="0">
-                <a:latin typeface="Verdana Regular"/>
-                <a:ea typeface="Verdana"/>
-                <a:cs typeface="Verdana"/>
-              </a:rPr>
-              <a:t>.</a:t>
+              <a:t>Next, the user will be directed chart page where they may enter adjustments to the yield for each budget that they selected based on the climate variables shown.</a:t>
             </a:r>
             <a:endParaRPr lang="en-US" sz="7250" dirty="0">
               <a:latin typeface="Verdana Regular"/>
@@ -3727,69 +3532,19 @@
               <a:buAutoNum type="arabicPeriod"/>
             </a:pPr>
             <a:r>
-              <a:rPr lang="en-US" sz="2800" dirty="0" smtClean="0">
+              <a:rPr lang="en-US" sz="2800" dirty="0">
                 <a:latin typeface="Verdana Regular"/>
                 <a:ea typeface="Verdana"/>
                 <a:cs typeface="Verdana"/>
               </a:rPr>
-              <a:t>The </a:t>
-            </a:r>
-            <a:r>
-              <a:rPr lang="en-US" sz="2800" dirty="0" smtClean="0">
-                <a:latin typeface="Verdana Regular"/>
-                <a:ea typeface="Verdana"/>
-                <a:cs typeface="Verdana"/>
-              </a:rPr>
-              <a:t>user </a:t>
-            </a:r>
-            <a:r>
-              <a:rPr lang="en-US" sz="2800" dirty="0">
-                <a:latin typeface="Verdana Regular"/>
-                <a:ea typeface="Verdana"/>
-                <a:cs typeface="Verdana"/>
-              </a:rPr>
-              <a:t>will then be directed to the budget page where </a:t>
-            </a:r>
-            <a:r>
-              <a:rPr lang="en-US" sz="2800" dirty="0" smtClean="0">
-                <a:latin typeface="Verdana Regular"/>
-                <a:ea typeface="Verdana"/>
-                <a:cs typeface="Verdana"/>
-              </a:rPr>
-              <a:t>adjustments </a:t>
-            </a:r>
-            <a:r>
-              <a:rPr lang="en-US" sz="2800" dirty="0">
-                <a:latin typeface="Verdana Regular"/>
-                <a:ea typeface="Verdana"/>
-                <a:cs typeface="Verdana"/>
-              </a:rPr>
-              <a:t>to prices, </a:t>
-            </a:r>
-            <a:r>
-              <a:rPr lang="en-US" sz="2800" dirty="0" smtClean="0">
-                <a:latin typeface="Verdana Regular"/>
-                <a:ea typeface="Verdana"/>
-                <a:cs typeface="Verdana"/>
-              </a:rPr>
-              <a:t>inputs, </a:t>
-            </a:r>
-            <a:r>
-              <a:rPr lang="en-US" sz="2800" dirty="0">
-                <a:latin typeface="Verdana Regular"/>
-                <a:ea typeface="Verdana"/>
-                <a:cs typeface="Verdana"/>
-              </a:rPr>
-              <a:t>and other budget </a:t>
-            </a:r>
-            <a:r>
-              <a:rPr lang="en-US" sz="2800" dirty="0" smtClean="0">
-                <a:latin typeface="Verdana Regular"/>
-                <a:ea typeface="Verdana"/>
-                <a:cs typeface="Verdana"/>
-              </a:rPr>
-              <a:t>parameters may be made for selected budgets.</a:t>
-            </a:r>
+              <a:t>The user will then be directed to the budget page where adjustments to prices, inputs, and other budget parameters may be made for selected budgets.</a:t>
+            </a:r>
+          </a:p>
+          <a:p>
+            <a:pPr marL="514350" indent="-514350">
+              <a:buFont typeface="+mj-lt"/>
+              <a:buAutoNum type="arabicPeriod"/>
+            </a:pPr>
             <a:endParaRPr lang="en-US" sz="2800" dirty="0">
               <a:latin typeface="Verdana Regular"/>
               <a:ea typeface="Verdana"/>
@@ -3801,48 +3556,13 @@
               <a:buFont typeface="+mj-lt"/>
               <a:buAutoNum type="arabicPeriod"/>
             </a:pPr>
-            <a:endParaRPr lang="en-US" sz="2800" dirty="0" smtClean="0">
-              <a:latin typeface="Verdana Regular"/>
-              <a:ea typeface="Verdana"/>
-              <a:cs typeface="Verdana"/>
-            </a:endParaRPr>
-          </a:p>
-          <a:p>
-            <a:pPr marL="514350" indent="-514350">
-              <a:buFont typeface="+mj-lt"/>
-              <a:buAutoNum type="arabicPeriod"/>
-            </a:pPr>
-            <a:r>
-              <a:rPr lang="en-US" sz="2800" dirty="0" smtClean="0">
+            <a:r>
+              <a:rPr lang="en-US" sz="2800" dirty="0">
                 <a:latin typeface="Verdana Regular"/>
                 <a:ea typeface="Verdana"/>
                 <a:cs typeface="Verdana"/>
               </a:rPr>
-              <a:t>Finally </a:t>
-            </a:r>
-            <a:r>
-              <a:rPr lang="en-US" sz="2800" dirty="0">
-                <a:latin typeface="Verdana Regular"/>
-                <a:ea typeface="Verdana"/>
-                <a:cs typeface="Verdana"/>
-              </a:rPr>
-              <a:t>the user will be directed to a climate summary page summarizing how the climate projections will </a:t>
-            </a:r>
-            <a:r>
-              <a:rPr lang="en-US" sz="2800" dirty="0" smtClean="0">
-                <a:latin typeface="Verdana Regular"/>
-                <a:ea typeface="Verdana"/>
-                <a:cs typeface="Verdana"/>
-              </a:rPr>
-              <a:t>affect </a:t>
-            </a:r>
-            <a:r>
-              <a:rPr lang="en-US" sz="2800" dirty="0">
-                <a:latin typeface="Verdana Regular"/>
-                <a:ea typeface="Verdana"/>
-                <a:cs typeface="Verdana"/>
-              </a:rPr>
-              <a:t>their budget.</a:t>
+              <a:t>Finally the user will be directed to a climate summary page summarizing how the climate projections will affect their budget.</a:t>
             </a:r>
             <a:endParaRPr lang="en-US" dirty="0">
               <a:latin typeface="Verdana Regular"/>
@@ -4040,7 +3760,7 @@
           <a:lstStyle/>
           <a:p>
             <a:r>
-              <a:rPr lang="en-US" sz="12500" i="1" dirty="0" err="1" smtClean="0">
+              <a:rPr lang="en-US" sz="12500" i="1" dirty="0" err="1">
                 <a:solidFill>
                   <a:srgbClr val="DC4405"/>
                 </a:solidFill>
@@ -4049,7 +3769,7 @@
               <a:t>AgBiz</a:t>
             </a:r>
             <a:r>
-              <a:rPr lang="en-US" sz="12500" i="1" dirty="0" smtClean="0">
+              <a:rPr lang="en-US" sz="12500" i="1" dirty="0">
                 <a:solidFill>
                   <a:srgbClr val="DC4405"/>
                 </a:solidFill>
@@ -4058,7 +3778,7 @@
               <a:t>-Logic: </a:t>
             </a:r>
             <a:r>
-              <a:rPr lang="en-US" sz="12500" i="1" dirty="0" err="1" smtClean="0">
+              <a:rPr lang="en-US" sz="12500" i="1" dirty="0" err="1">
                 <a:solidFill>
                   <a:srgbClr val="DC4405"/>
                 </a:solidFill>
@@ -4202,7 +3922,7 @@
           <a:p>
             <a:pPr algn="ctr"/>
             <a:r>
-              <a:rPr lang="en-US" sz="4800" i="1" dirty="0" err="1" smtClean="0">
+              <a:rPr lang="en-US" sz="4800" i="1" dirty="0" err="1">
                 <a:solidFill>
                   <a:schemeClr val="bg1"/>
                 </a:solidFill>
@@ -4213,7 +3933,7 @@
               <a:t>AgBiz</a:t>
             </a:r>
             <a:r>
-              <a:rPr lang="en-US" sz="4800" i="1" dirty="0" smtClean="0">
+              <a:rPr lang="en-US" sz="4800" i="1" dirty="0">
                 <a:solidFill>
                   <a:schemeClr val="bg1"/>
                 </a:solidFill>
@@ -4223,14 +3943,6 @@
               </a:rPr>
               <a:t>-Logic</a:t>
             </a:r>
-            <a:endParaRPr lang="en-US" sz="4800" i="1" dirty="0">
-              <a:solidFill>
-                <a:schemeClr val="bg1"/>
-              </a:solidFill>
-              <a:latin typeface="Verdana Regular"/>
-              <a:ea typeface="Verdana" panose="020B0604030504040204" pitchFamily="34" charset="0"/>
-              <a:cs typeface="Verdana" panose="020B0604030504040204" pitchFamily="34" charset="0"/>
-            </a:endParaRPr>
           </a:p>
         </p:txBody>
       </p:sp>
@@ -4358,28 +4070,12 @@
           </a:lstStyle>
           <a:p>
             <a:r>
-              <a:rPr lang="en-US" sz="2800" dirty="0" smtClean="0">
-                <a:latin typeface="Kievit Offc" charset="0"/>
-                <a:ea typeface="Kievit Offc" charset="0"/>
-                <a:cs typeface="Kievit Offc" charset="0"/>
-              </a:rPr>
-              <a:t>Climate </a:t>
-            </a:r>
-            <a:r>
               <a:rPr lang="en-US" sz="2800" dirty="0">
                 <a:latin typeface="Kievit Offc" charset="0"/>
                 <a:ea typeface="Kievit Offc" charset="0"/>
                 <a:cs typeface="Kievit Offc" charset="0"/>
               </a:rPr>
-              <a:t>change is a huge problem facing many farmers and ranchers. As the climate changes farmers will need to adapt and modify what they grow and how they grow it. To solve this problem will require intelligent data driven solutions</a:t>
-            </a:r>
-            <a:r>
-              <a:rPr lang="en-US" sz="2800" dirty="0" smtClean="0">
-                <a:latin typeface="Kievit Offc" charset="0"/>
-                <a:ea typeface="Kievit Offc" charset="0"/>
-                <a:cs typeface="Kievit Offc" charset="0"/>
-              </a:rPr>
-              <a:t>.</a:t>
+              <a:t>Climate change is a huge problem facing many farmers and ranchers. As the climate changes farmers will need to adapt and modify what they grow and how they grow it. To solve this problem will require intelligent data driven solutions.</a:t>
             </a:r>
           </a:p>
           <a:p>
@@ -4391,36 +4087,12 @@
           </a:p>
           <a:p>
             <a:r>
-              <a:rPr lang="en-US" sz="2800" dirty="0" smtClean="0">
-                <a:latin typeface="Kievit Offc" charset="0"/>
-                <a:ea typeface="Kievit Offc" charset="0"/>
-                <a:cs typeface="Kievit Offc" charset="0"/>
-              </a:rPr>
-              <a:t>This </a:t>
-            </a:r>
-            <a:r>
               <a:rPr lang="en-US" sz="2800" dirty="0">
                 <a:latin typeface="Kievit Offc" charset="0"/>
                 <a:ea typeface="Kievit Offc" charset="0"/>
                 <a:cs typeface="Kievit Offc" charset="0"/>
               </a:rPr>
-              <a:t>project seeks to arm farmers and rancher with a suit of climate tools to help mitigate the effects of climate change. Currently there is already a long term climate tool that helps make longer term predictions. The focus of this project is providing seasonal guidance to farmers and </a:t>
-            </a:r>
-            <a:r>
-              <a:rPr lang="en-US" sz="2800" dirty="0" smtClean="0">
-                <a:latin typeface="Kievit Offc" charset="0"/>
-                <a:ea typeface="Kievit Offc" charset="0"/>
-                <a:cs typeface="Kievit Offc" charset="0"/>
-              </a:rPr>
-              <a:t>ranches, </a:t>
-            </a:r>
-            <a:r>
-              <a:rPr lang="en-US" sz="2800" dirty="0">
-                <a:latin typeface="Kievit Offc" charset="0"/>
-                <a:ea typeface="Kievit Offc" charset="0"/>
-                <a:cs typeface="Kievit Offc" charset="0"/>
-              </a:rPr>
-              <a:t>ultimately helping farmers to be more efficient and more profitable.</a:t>
+              <a:t>This project seeks to arm farmers and rancher with a suit of climate tools to help mitigate the effects of climate change. Currently there is already a long term climate tool that helps make longer term predictions. The focus of this project is providing seasonal guidance to farmers and ranches, ultimately helping farmers to be more efficient and more profitable.</a:t>
             </a:r>
           </a:p>
         </p:txBody>
@@ -4460,25 +4132,11 @@
               <a:buChar char="§"/>
             </a:pPr>
             <a:r>
-              <a:rPr lang="en-US" sz="2800" dirty="0" smtClean="0">
+              <a:rPr lang="en-US" sz="2800" dirty="0">
                 <a:latin typeface="Verdana Regular"/>
                 <a:cs typeface="Arial"/>
               </a:rPr>
-              <a:t>REST </a:t>
-            </a:r>
-            <a:r>
-              <a:rPr lang="en-US" sz="2800" dirty="0">
-                <a:latin typeface="Verdana Regular"/>
-                <a:cs typeface="Arial"/>
-              </a:rPr>
-              <a:t>API that provides the climate data for the short term projections.</a:t>
-            </a:r>
-            <a:r>
-              <a:rPr lang="en-US" sz="2800" dirty="0" smtClean="0">
-                <a:latin typeface="Verdana Regular"/>
-                <a:cs typeface="Arial"/>
-              </a:rPr>
-              <a:t>​</a:t>
+              <a:t>REST API that provides the climate data for the short term projections.​</a:t>
             </a:r>
             <a:endParaRPr lang="en-US" sz="2800" dirty="0">
               <a:latin typeface="Verdana Regular"/>
@@ -4491,18 +4149,11 @@
               <a:buChar char="§"/>
             </a:pPr>
             <a:r>
-              <a:rPr lang="en-US" sz="2800" dirty="0" smtClean="0">
+              <a:rPr lang="en-US" sz="2800" dirty="0">
                 <a:latin typeface="Verdana Regular"/>
                 <a:cs typeface="Arial"/>
               </a:rPr>
-              <a:t>Data: Downscaled version of NOAA’s NMME dataset hosted by University Of Idah</a:t>
-            </a:r>
-            <a:r>
-              <a:rPr lang="en-US" sz="2800" dirty="0" smtClean="0">
-                <a:latin typeface="Verdana Regular"/>
-                <a:cs typeface="Arial"/>
-              </a:rPr>
-              <a:t>o.</a:t>
+              <a:t>Data: Downscaled version of NOAA’s NMME dataset hosted by University Of Idaho.</a:t>
             </a:r>
           </a:p>
           <a:p>
@@ -4511,18 +4162,11 @@
               <a:buChar char="§"/>
             </a:pPr>
             <a:r>
-              <a:rPr lang="en-US" sz="2800" dirty="0" smtClean="0">
+              <a:rPr lang="en-US" sz="2800" dirty="0">
                 <a:latin typeface="Verdana Regular"/>
                 <a:cs typeface="Arial"/>
               </a:rPr>
-              <a:t>Data files are stored on the production server. </a:t>
-            </a:r>
-            <a:r>
-              <a:rPr lang="en-US" sz="2800" dirty="0" smtClean="0">
-                <a:latin typeface="Verdana Regular"/>
-                <a:cs typeface="Arial"/>
-              </a:rPr>
-              <a:t>The production sever updates the data at the same date every month.</a:t>
+              <a:t>Data files are stored on the production server. The production sever updates the data at the same date every month.</a:t>
             </a:r>
             <a:endParaRPr lang="en-US" sz="2800" dirty="0">
               <a:latin typeface="Verdana Regular"/>
@@ -4535,7 +4179,7 @@
               <a:buChar char="§"/>
             </a:pPr>
             <a:r>
-              <a:rPr lang="en-US" sz="2800" dirty="0" smtClean="0">
+              <a:rPr lang="en-US" sz="2800" dirty="0">
                 <a:latin typeface="Verdana Regular"/>
                 <a:cs typeface="Arial"/>
               </a:rPr>
@@ -4548,18 +4192,11 @@
               <a:buChar char="§"/>
             </a:pPr>
             <a:r>
-              <a:rPr lang="en-US" sz="2800" dirty="0" smtClean="0">
+              <a:rPr lang="en-US" sz="2800" dirty="0">
                 <a:latin typeface="Verdana Regular"/>
                 <a:cs typeface="Arial"/>
               </a:rPr>
-              <a:t>API </a:t>
-            </a:r>
-            <a:r>
-              <a:rPr lang="en-US" sz="2800" dirty="0">
-                <a:latin typeface="Verdana Regular"/>
-                <a:cs typeface="Arial"/>
-              </a:rPr>
-              <a:t>Uses latitude and longitude to determine the users location. ​</a:t>
+              <a:t>API Uses latitude and longitude to determine the users location. ​</a:t>
             </a:r>
             <a:endParaRPr lang="en-US" sz="2800" dirty="0">
               <a:latin typeface="Verdana Regular"/>
@@ -4576,28 +4213,7 @@
                 <a:latin typeface="Verdana Regular"/>
                 <a:cs typeface="Arial"/>
               </a:rPr>
-              <a:t>Gets the data for the nearest location within a radius of </a:t>
-            </a:r>
-            <a:r>
-              <a:rPr lang="en-US" sz="2800" dirty="0" smtClean="0">
-                <a:latin typeface="Verdana Regular"/>
-                <a:cs typeface="Arial"/>
-              </a:rPr>
-              <a:t>20</a:t>
-            </a:r>
-            <a:r>
-              <a:rPr lang="en-US" sz="2800" dirty="0" smtClean="0">
-                <a:latin typeface="Verdana Regular"/>
-                <a:cs typeface="Arial"/>
-              </a:rPr>
-              <a:t> </a:t>
-            </a:r>
-            <a:r>
-              <a:rPr lang="en-US" sz="2800" dirty="0">
-                <a:latin typeface="Verdana Regular"/>
-                <a:cs typeface="Arial"/>
-              </a:rPr>
-              <a:t>miles if no data is available for a certain location.</a:t>
+              <a:t>Gets the data for the nearest location within a radius of 20 miles if no data is available for a certain location.</a:t>
             </a:r>
             <a:endParaRPr lang="en-US" sz="2800" dirty="0">
               <a:latin typeface="Verdana Regular"/>
@@ -4670,25 +4286,25 @@
               <a:rPr lang="en-US" sz="2800" dirty="0">
                 <a:latin typeface="Georgia" panose="02040502050405020303" pitchFamily="18" charset="0"/>
               </a:rPr>
-              <a:t> suite of decision tools. This submodule specializes in assisting farmers and ranchers by supplying them with short and long term weather data which they can use to make </a:t>
-            </a:r>
-            <a:r>
-              <a:rPr lang="en-US" sz="2800" dirty="0" smtClean="0">
+              <a:t> suite of decision tools. This submodule specializes in assisting farmers and ranchers by supplying them with short and long term weather data which they can use to make financial decisions. More specifically, </a:t>
+            </a:r>
+            <a:r>
+              <a:rPr lang="en-US" sz="2800" i="1" dirty="0" err="1">
                 <a:latin typeface="Georgia" panose="02040502050405020303" pitchFamily="18" charset="0"/>
               </a:rPr>
-              <a:t>financial decisions</a:t>
-            </a:r>
-            <a:r>
-              <a:rPr lang="en-US" sz="2800" dirty="0" smtClean="0">
+              <a:t>AgBizClimate</a:t>
+            </a:r>
+            <a:r>
+              <a:rPr lang="en-US" sz="2800" i="1" dirty="0">
                 <a:latin typeface="Georgia" panose="02040502050405020303" pitchFamily="18" charset="0"/>
               </a:rPr>
-              <a:t>. </a:t>
+              <a:t> </a:t>
             </a:r>
             <a:r>
               <a:rPr lang="en-US" sz="2800" dirty="0">
                 <a:latin typeface="Georgia" panose="02040502050405020303" pitchFamily="18" charset="0"/>
               </a:rPr>
-              <a:t>More specifically, </a:t>
+              <a:t>provides precipitation and temperature information in a series of graphs associated to the location the users selected via latitude and longitude. Users are then able to input the percent they believe these factors will influence their yields , </a:t>
             </a:r>
             <a:r>
               <a:rPr lang="en-US" sz="2800" i="1" dirty="0" err="1">
@@ -4697,87 +4313,10 @@
               <a:t>AgBizClimate</a:t>
             </a:r>
             <a:r>
-              <a:rPr lang="en-US" sz="2800" i="1" dirty="0">
-                <a:latin typeface="Georgia" panose="02040502050405020303" pitchFamily="18" charset="0"/>
-              </a:rPr>
-              <a:t> </a:t>
-            </a:r>
-            <a:r>
               <a:rPr lang="en-US" sz="2800" dirty="0">
                 <a:latin typeface="Georgia" panose="02040502050405020303" pitchFamily="18" charset="0"/>
               </a:rPr>
-              <a:t>provides precipitation and temperature information in a series of graphs associated to the location the users selected via latitude and longitude. Users are then able to input the percent they believe these factors will influence their yields </a:t>
-            </a:r>
-            <a:r>
-              <a:rPr lang="en-US" sz="2800" dirty="0" smtClean="0">
-                <a:latin typeface="Georgia" panose="02040502050405020303" pitchFamily="18" charset="0"/>
-              </a:rPr>
-              <a:t>, </a:t>
-            </a:r>
-            <a:r>
-              <a:rPr lang="en-US" sz="2800" i="1" dirty="0" err="1" smtClean="0">
-                <a:latin typeface="Georgia" panose="02040502050405020303" pitchFamily="18" charset="0"/>
-              </a:rPr>
-              <a:t>AgBizClimate</a:t>
-            </a:r>
-            <a:r>
-              <a:rPr lang="en-US" sz="2800" dirty="0" smtClean="0">
-                <a:latin typeface="Georgia" panose="02040502050405020303" pitchFamily="18" charset="0"/>
-              </a:rPr>
-              <a:t> will then </a:t>
-            </a:r>
-            <a:r>
-              <a:rPr lang="en-US" sz="2800" dirty="0">
-                <a:latin typeface="Georgia" panose="02040502050405020303" pitchFamily="18" charset="0"/>
-              </a:rPr>
-              <a:t>return </a:t>
-            </a:r>
-            <a:r>
-              <a:rPr lang="en-US" sz="2800" dirty="0" smtClean="0">
-                <a:latin typeface="Georgia" panose="02040502050405020303" pitchFamily="18" charset="0"/>
-              </a:rPr>
-              <a:t>the results of the calculations based on the users to </a:t>
-            </a:r>
-            <a:r>
-              <a:rPr lang="en-US" sz="2800" dirty="0">
-                <a:latin typeface="Georgia" panose="02040502050405020303" pitchFamily="18" charset="0"/>
-              </a:rPr>
-              <a:t>assist their decisions.</a:t>
-            </a:r>
-          </a:p>
-        </p:txBody>
-      </p:sp>
-      <p:sp>
-        <p:nvSpPr>
-          <p:cNvPr id="2" name="TextBox 1">
-            <a:extLst>
-              <a:ext uri="{FF2B5EF4-FFF2-40B4-BE49-F238E27FC236}">
-                <a16:creationId xmlns:a16="http://schemas.microsoft.com/office/drawing/2014/main" id="{F7C96C28-A807-4C31-A986-520137AEE634}"/>
-              </a:ext>
-            </a:extLst>
-          </p:cNvPr>
-          <p:cNvSpPr txBox="1"/>
-          <p:nvPr/>
-        </p:nvSpPr>
-        <p:spPr>
-          <a:xfrm>
-            <a:off x="34221420" y="24048719"/>
-            <a:ext cx="7736734" cy="3323987"/>
-          </a:xfrm>
-          <a:prstGeom prst="rect">
-            <a:avLst/>
-          </a:prstGeom>
-          <a:noFill/>
-        </p:spPr>
-        <p:txBody>
-          <a:bodyPr wrap="square" rtlCol="0">
-            <a:spAutoFit/>
-          </a:bodyPr>
-          <a:lstStyle/>
-          <a:p>
-            <a:r>
-              <a:rPr lang="en-US" dirty="0"/>
-              <a:t>Put Team PHOTO HEEEEEEEEEEER BOIIIIIIIIIIIIIIIIIIIIIII</a:t>
+              <a:t> will then return the results of the calculations based on the users to assist their decisions.</a:t>
             </a:r>
           </a:p>
         </p:txBody>
@@ -4797,7 +4336,7 @@
           <p:nvPr/>
         </p:nvPicPr>
         <p:blipFill>
-          <a:blip r:embed="rId2"/>
+          <a:blip r:embed="rId3"/>
           <a:stretch>
             <a:fillRect/>
           </a:stretch>
@@ -4827,7 +4366,7 @@
           <p:nvPr/>
         </p:nvPicPr>
         <p:blipFill>
-          <a:blip r:embed="rId3"/>
+          <a:blip r:embed="rId4"/>
           <a:stretch>
             <a:fillRect/>
           </a:stretch>
@@ -4857,7 +4396,7 @@
           <p:nvPr/>
         </p:nvPicPr>
         <p:blipFill>
-          <a:blip r:embed="rId4"/>
+          <a:blip r:embed="rId5"/>
           <a:stretch>
             <a:fillRect/>
           </a:stretch>
@@ -4895,38 +4434,35 @@
           <a:lstStyle/>
           <a:p>
             <a:r>
-              <a:rPr lang="en-US" sz="2800" b="1" dirty="0" smtClean="0">
+              <a:rPr lang="en-US" sz="2800" b="1" dirty="0">
                 <a:latin typeface="Verdana Regular"/>
               </a:rPr>
               <a:t>Figure 1: </a:t>
             </a:r>
             <a:r>
-              <a:rPr lang="en-US" sz="2800" dirty="0" smtClean="0">
+              <a:rPr lang="en-US" sz="2800" dirty="0">
                 <a:latin typeface="Verdana Regular"/>
               </a:rPr>
               <a:t>A screenshot of the </a:t>
             </a:r>
             <a:r>
-              <a:rPr lang="en-US" sz="2800" i="1" dirty="0" err="1" smtClean="0">
+              <a:rPr lang="en-US" sz="2800" i="1" dirty="0" err="1">
                 <a:latin typeface="Verdana Regular"/>
               </a:rPr>
               <a:t>AgBiz</a:t>
             </a:r>
             <a:r>
-              <a:rPr lang="en-US" sz="2800" i="1" dirty="0" smtClean="0">
+              <a:rPr lang="en-US" sz="2800" i="1" dirty="0">
                 <a:latin typeface="Verdana Regular"/>
               </a:rPr>
               <a:t>-Logic</a:t>
             </a:r>
             <a:r>
-              <a:rPr lang="en-US" sz="2800" dirty="0" smtClean="0">
+              <a:rPr lang="en-US" sz="2800" dirty="0">
                 <a:latin typeface="Verdana Regular"/>
               </a:rPr>
               <a:t> Short term Climate tool. This Screen Shot shows the plotting  tool where the user can make choices about their crop based on the plot.</a:t>
             </a:r>
-            <a:endParaRPr lang="en-US" sz="2800" dirty="0">
-              <a:latin typeface="Verdana Regular"/>
-            </a:endParaRPr>
           </a:p>
         </p:txBody>
       </p:sp>
@@ -4953,19 +4489,19 @@
           <a:lstStyle/>
           <a:p>
             <a:r>
-              <a:rPr lang="en-US" sz="2800" b="1" dirty="0" smtClean="0">
+              <a:rPr lang="en-US" sz="2800" b="1" dirty="0">
                 <a:latin typeface="Verdana Regular"/>
               </a:rPr>
               <a:t>Figure 2: </a:t>
             </a:r>
             <a:r>
-              <a:rPr lang="en-US" sz="2800" dirty="0" smtClean="0">
+              <a:rPr lang="en-US" sz="2800" dirty="0">
                 <a:latin typeface="Verdana Regular"/>
               </a:rPr>
               <a:t>Shown Above is a use case diagram for the </a:t>
             </a:r>
             <a:r>
-              <a:rPr lang="en-US" sz="2800" i="1" dirty="0" err="1" smtClean="0">
+              <a:rPr lang="en-US" sz="2800" i="1" dirty="0" err="1">
                 <a:latin typeface="Verdana Regular"/>
               </a:rPr>
               <a:t>AgBizClimate</a:t>
@@ -4974,17 +4510,376 @@
               <a:rPr lang="en-US" sz="2800" dirty="0">
                 <a:latin typeface="Verdana Regular"/>
               </a:rPr>
-              <a:t> </a:t>
-            </a:r>
-            <a:r>
-              <a:rPr lang="en-US" sz="2800" dirty="0" smtClean="0">
-                <a:latin typeface="Verdana Regular"/>
-              </a:rPr>
-              <a:t>tool.</a:t>
+              <a:t> tool.</a:t>
             </a:r>
             <a:endParaRPr lang="en-US" sz="2800" b="1" dirty="0">
               <a:latin typeface="Verdana Regular"/>
             </a:endParaRPr>
+          </a:p>
+        </p:txBody>
+      </p:sp>
+      <p:pic>
+        <p:nvPicPr>
+          <p:cNvPr id="11" name="Picture 10">
+            <a:extLst>
+              <a:ext uri="{FF2B5EF4-FFF2-40B4-BE49-F238E27FC236}">
+                <a16:creationId xmlns:a16="http://schemas.microsoft.com/office/drawing/2014/main" id="{4219221F-4E84-4780-A13F-B926FA911C29}"/>
+              </a:ext>
+            </a:extLst>
+          </p:cNvPr>
+          <p:cNvPicPr>
+            <a:picLocks noChangeAspect="1"/>
+          </p:cNvPicPr>
+          <p:nvPr/>
+        </p:nvPicPr>
+        <p:blipFill>
+          <a:blip r:embed="rId6"/>
+          <a:stretch>
+            <a:fillRect/>
+          </a:stretch>
+        </p:blipFill>
+        <p:spPr>
+          <a:xfrm>
+            <a:off x="38403133" y="28428662"/>
+            <a:ext cx="2765177" cy="2765177"/>
+          </a:xfrm>
+          <a:prstGeom prst="rect">
+            <a:avLst/>
+          </a:prstGeom>
+        </p:spPr>
+      </p:pic>
+      <p:pic>
+        <p:nvPicPr>
+          <p:cNvPr id="14" name="Picture 13">
+            <a:extLst>
+              <a:ext uri="{FF2B5EF4-FFF2-40B4-BE49-F238E27FC236}">
+                <a16:creationId xmlns:a16="http://schemas.microsoft.com/office/drawing/2014/main" id="{E3187515-9C63-463E-A7F7-D6925C43784C}"/>
+              </a:ext>
+            </a:extLst>
+          </p:cNvPr>
+          <p:cNvPicPr>
+            <a:picLocks noChangeAspect="1"/>
+          </p:cNvPicPr>
+          <p:nvPr/>
+        </p:nvPicPr>
+        <p:blipFill>
+          <a:blip r:embed="rId7"/>
+          <a:stretch>
+            <a:fillRect/>
+          </a:stretch>
+        </p:blipFill>
+        <p:spPr>
+          <a:xfrm>
+            <a:off x="38584556" y="21694361"/>
+            <a:ext cx="2402332" cy="2909246"/>
+          </a:xfrm>
+          <a:prstGeom prst="rect">
+            <a:avLst/>
+          </a:prstGeom>
+        </p:spPr>
+      </p:pic>
+      <p:pic>
+        <p:nvPicPr>
+          <p:cNvPr id="16" name="Picture 15">
+            <a:extLst>
+              <a:ext uri="{FF2B5EF4-FFF2-40B4-BE49-F238E27FC236}">
+                <a16:creationId xmlns:a16="http://schemas.microsoft.com/office/drawing/2014/main" id="{1FB0BB0C-48DE-4F46-85F1-E6723CEF2373}"/>
+              </a:ext>
+            </a:extLst>
+          </p:cNvPr>
+          <p:cNvPicPr>
+            <a:picLocks noChangeAspect="1"/>
+          </p:cNvPicPr>
+          <p:nvPr/>
+        </p:nvPicPr>
+        <p:blipFill>
+          <a:blip r:embed="rId8"/>
+          <a:stretch>
+            <a:fillRect/>
+          </a:stretch>
+        </p:blipFill>
+        <p:spPr>
+          <a:xfrm>
+            <a:off x="38584556" y="25404832"/>
+            <a:ext cx="2402332" cy="2402332"/>
+          </a:xfrm>
+          <a:prstGeom prst="rect">
+            <a:avLst/>
+          </a:prstGeom>
+        </p:spPr>
+      </p:pic>
+      <p:sp>
+        <p:nvSpPr>
+          <p:cNvPr id="26" name="TextBox 1">
+            <a:extLst>
+              <a:ext uri="{FF2B5EF4-FFF2-40B4-BE49-F238E27FC236}">
+                <a16:creationId xmlns:a16="http://schemas.microsoft.com/office/drawing/2014/main" id="{0E86434E-AEAB-486E-8539-FDBEA1D53F4E}"/>
+              </a:ext>
+            </a:extLst>
+          </p:cNvPr>
+          <p:cNvSpPr txBox="1"/>
+          <p:nvPr/>
+        </p:nvSpPr>
+        <p:spPr>
+          <a:xfrm>
+            <a:off x="36614697" y="20049055"/>
+            <a:ext cx="3053080" cy="830997"/>
+          </a:xfrm>
+          <a:prstGeom prst="rect">
+            <a:avLst/>
+          </a:prstGeom>
+        </p:spPr>
+        <p:txBody>
+          <a:bodyPr rot="0" spcFirstLastPara="0" vert="horz" wrap="square" lIns="91440" tIns="45720" rIns="91440" bIns="45720" numCol="1" spcCol="0" rtlCol="0" fromWordArt="0" anchor="t" anchorCtr="0" forceAA="0" compatLnSpc="1">
+            <a:prstTxWarp prst="textNoShape">
+              <a:avLst/>
+            </a:prstTxWarp>
+            <a:spAutoFit/>
+          </a:bodyPr>
+          <a:lstStyle>
+            <a:defPPr>
+              <a:defRPr lang="en-US"/>
+            </a:defPPr>
+            <a:lvl1pPr marL="0" algn="l" defTabSz="3686861" rtl="0" eaLnBrk="1" latinLnBrk="0" hangingPunct="1">
+              <a:defRPr sz="7258" kern="1200">
+                <a:solidFill>
+                  <a:schemeClr val="tx1"/>
+                </a:solidFill>
+                <a:latin typeface="+mn-lt"/>
+                <a:ea typeface="+mn-ea"/>
+                <a:cs typeface="+mn-cs"/>
+              </a:defRPr>
+            </a:lvl1pPr>
+            <a:lvl2pPr marL="1843430" algn="l" defTabSz="3686861" rtl="0" eaLnBrk="1" latinLnBrk="0" hangingPunct="1">
+              <a:defRPr sz="7258" kern="1200">
+                <a:solidFill>
+                  <a:schemeClr val="tx1"/>
+                </a:solidFill>
+                <a:latin typeface="+mn-lt"/>
+                <a:ea typeface="+mn-ea"/>
+                <a:cs typeface="+mn-cs"/>
+              </a:defRPr>
+            </a:lvl2pPr>
+            <a:lvl3pPr marL="3686861" algn="l" defTabSz="3686861" rtl="0" eaLnBrk="1" latinLnBrk="0" hangingPunct="1">
+              <a:defRPr sz="7258" kern="1200">
+                <a:solidFill>
+                  <a:schemeClr val="tx1"/>
+                </a:solidFill>
+                <a:latin typeface="+mn-lt"/>
+                <a:ea typeface="+mn-ea"/>
+                <a:cs typeface="+mn-cs"/>
+              </a:defRPr>
+            </a:lvl3pPr>
+            <a:lvl4pPr marL="5530291" algn="l" defTabSz="3686861" rtl="0" eaLnBrk="1" latinLnBrk="0" hangingPunct="1">
+              <a:defRPr sz="7258" kern="1200">
+                <a:solidFill>
+                  <a:schemeClr val="tx1"/>
+                </a:solidFill>
+                <a:latin typeface="+mn-lt"/>
+                <a:ea typeface="+mn-ea"/>
+                <a:cs typeface="+mn-cs"/>
+              </a:defRPr>
+            </a:lvl4pPr>
+            <a:lvl5pPr marL="7373722" algn="l" defTabSz="3686861" rtl="0" eaLnBrk="1" latinLnBrk="0" hangingPunct="1">
+              <a:defRPr sz="7258" kern="1200">
+                <a:solidFill>
+                  <a:schemeClr val="tx1"/>
+                </a:solidFill>
+                <a:latin typeface="+mn-lt"/>
+                <a:ea typeface="+mn-ea"/>
+                <a:cs typeface="+mn-cs"/>
+              </a:defRPr>
+            </a:lvl5pPr>
+            <a:lvl6pPr marL="9217152" algn="l" defTabSz="3686861" rtl="0" eaLnBrk="1" latinLnBrk="0" hangingPunct="1">
+              <a:defRPr sz="7258" kern="1200">
+                <a:solidFill>
+                  <a:schemeClr val="tx1"/>
+                </a:solidFill>
+                <a:latin typeface="+mn-lt"/>
+                <a:ea typeface="+mn-ea"/>
+                <a:cs typeface="+mn-cs"/>
+              </a:defRPr>
+            </a:lvl6pPr>
+            <a:lvl7pPr marL="11060582" algn="l" defTabSz="3686861" rtl="0" eaLnBrk="1" latinLnBrk="0" hangingPunct="1">
+              <a:defRPr sz="7258" kern="1200">
+                <a:solidFill>
+                  <a:schemeClr val="tx1"/>
+                </a:solidFill>
+                <a:latin typeface="+mn-lt"/>
+                <a:ea typeface="+mn-ea"/>
+                <a:cs typeface="+mn-cs"/>
+              </a:defRPr>
+            </a:lvl7pPr>
+            <a:lvl8pPr marL="12904013" algn="l" defTabSz="3686861" rtl="0" eaLnBrk="1" latinLnBrk="0" hangingPunct="1">
+              <a:defRPr sz="7258" kern="1200">
+                <a:solidFill>
+                  <a:schemeClr val="tx1"/>
+                </a:solidFill>
+                <a:latin typeface="+mn-lt"/>
+                <a:ea typeface="+mn-ea"/>
+                <a:cs typeface="+mn-cs"/>
+              </a:defRPr>
+            </a:lvl8pPr>
+            <a:lvl9pPr marL="14747443" algn="l" defTabSz="3686861" rtl="0" eaLnBrk="1" latinLnBrk="0" hangingPunct="1">
+              <a:defRPr sz="7258" kern="1200">
+                <a:solidFill>
+                  <a:schemeClr val="tx1"/>
+                </a:solidFill>
+                <a:latin typeface="+mn-lt"/>
+                <a:ea typeface="+mn-ea"/>
+                <a:cs typeface="+mn-cs"/>
+              </a:defRPr>
+            </a:lvl9pPr>
+          </a:lstStyle>
+          <a:p>
+            <a:r>
+              <a:rPr lang="en-US" sz="4800" dirty="0">
+                <a:solidFill>
+                  <a:schemeClr val="bg1"/>
+                </a:solidFill>
+                <a:latin typeface="Arial"/>
+                <a:cs typeface="Arial"/>
+              </a:rPr>
+              <a:t>The Team</a:t>
+            </a:r>
+          </a:p>
+        </p:txBody>
+      </p:sp>
+      <p:sp>
+        <p:nvSpPr>
+          <p:cNvPr id="17" name="TextBox 16">
+            <a:extLst>
+              <a:ext uri="{FF2B5EF4-FFF2-40B4-BE49-F238E27FC236}">
+                <a16:creationId xmlns:a16="http://schemas.microsoft.com/office/drawing/2014/main" id="{A4C68316-7784-4FE8-976E-E284CAFD66B1}"/>
+              </a:ext>
+            </a:extLst>
+          </p:cNvPr>
+          <p:cNvSpPr txBox="1"/>
+          <p:nvPr/>
+        </p:nvSpPr>
+        <p:spPr>
+          <a:xfrm>
+            <a:off x="33585118" y="22529998"/>
+            <a:ext cx="3759200" cy="707886"/>
+          </a:xfrm>
+          <a:prstGeom prst="rect">
+            <a:avLst/>
+          </a:prstGeom>
+          <a:noFill/>
+        </p:spPr>
+        <p:txBody>
+          <a:bodyPr wrap="square" rtlCol="0">
+            <a:spAutoFit/>
+          </a:bodyPr>
+          <a:lstStyle/>
+          <a:p>
+            <a:r>
+              <a:rPr lang="en-US" sz="4000" dirty="0">
+                <a:solidFill>
+                  <a:schemeClr val="bg1"/>
+                </a:solidFill>
+              </a:rPr>
+              <a:t>Thomas Noelcke</a:t>
+            </a:r>
+          </a:p>
+        </p:txBody>
+      </p:sp>
+      <p:sp>
+        <p:nvSpPr>
+          <p:cNvPr id="32" name="TextBox 31">
+            <a:extLst>
+              <a:ext uri="{FF2B5EF4-FFF2-40B4-BE49-F238E27FC236}">
+                <a16:creationId xmlns:a16="http://schemas.microsoft.com/office/drawing/2014/main" id="{89009F58-CB48-4244-A23B-201B72D2D00F}"/>
+              </a:ext>
+            </a:extLst>
+          </p:cNvPr>
+          <p:cNvSpPr txBox="1"/>
+          <p:nvPr/>
+        </p:nvSpPr>
+        <p:spPr>
+          <a:xfrm>
+            <a:off x="33585118" y="26429874"/>
+            <a:ext cx="3759200" cy="707886"/>
+          </a:xfrm>
+          <a:prstGeom prst="rect">
+            <a:avLst/>
+          </a:prstGeom>
+          <a:noFill/>
+        </p:spPr>
+        <p:txBody>
+          <a:bodyPr wrap="square" rtlCol="0">
+            <a:spAutoFit/>
+          </a:bodyPr>
+          <a:lstStyle/>
+          <a:p>
+            <a:r>
+              <a:rPr lang="en-US" sz="4000" dirty="0">
+                <a:solidFill>
+                  <a:schemeClr val="bg1"/>
+                </a:solidFill>
+              </a:rPr>
+              <a:t>Shane </a:t>
+            </a:r>
+            <a:r>
+              <a:rPr lang="en-US" sz="4000" dirty="0" err="1">
+                <a:solidFill>
+                  <a:schemeClr val="bg1"/>
+                </a:solidFill>
+              </a:rPr>
+              <a:t>Barrantes</a:t>
+            </a:r>
+            <a:endParaRPr lang="en-US" sz="4000" dirty="0">
+              <a:solidFill>
+                <a:schemeClr val="bg1"/>
+              </a:solidFill>
+            </a:endParaRPr>
+          </a:p>
+        </p:txBody>
+      </p:sp>
+      <p:sp>
+        <p:nvSpPr>
+          <p:cNvPr id="33" name="TextBox 32">
+            <a:extLst>
+              <a:ext uri="{FF2B5EF4-FFF2-40B4-BE49-F238E27FC236}">
+                <a16:creationId xmlns:a16="http://schemas.microsoft.com/office/drawing/2014/main" id="{CADEFAEC-920E-43FE-AD28-3524A29C56DA}"/>
+              </a:ext>
+            </a:extLst>
+          </p:cNvPr>
+          <p:cNvSpPr txBox="1"/>
+          <p:nvPr/>
+        </p:nvSpPr>
+        <p:spPr>
+          <a:xfrm>
+            <a:off x="33585118" y="29457307"/>
+            <a:ext cx="3759200" cy="707886"/>
+          </a:xfrm>
+          <a:prstGeom prst="rect">
+            <a:avLst/>
+          </a:prstGeom>
+          <a:noFill/>
+        </p:spPr>
+        <p:txBody>
+          <a:bodyPr wrap="square" rtlCol="0">
+            <a:spAutoFit/>
+          </a:bodyPr>
+          <a:lstStyle/>
+          <a:p>
+            <a:r>
+              <a:rPr lang="en-US" sz="4000" dirty="0" err="1">
+                <a:solidFill>
+                  <a:schemeClr val="bg1"/>
+                </a:solidFill>
+              </a:rPr>
+              <a:t>Shengpie</a:t>
+            </a:r>
+            <a:r>
+              <a:rPr lang="en-US" sz="4000" dirty="0">
+                <a:solidFill>
+                  <a:schemeClr val="bg1"/>
+                </a:solidFill>
+              </a:rPr>
+              <a:t> Yuan</a:t>
+            </a:r>
           </a:p>
         </p:txBody>
       </p:sp>
@@ -4998,13 +4893,6 @@
   <p:clrMapOvr>
     <a:masterClrMapping/>
   </p:clrMapOvr>
-  <p:timing>
-    <p:tnLst>
-      <p:par>
-        <p:cTn id="1" dur="indefinite" restart="never" nodeType="tmRoot"/>
-      </p:par>
-    </p:tnLst>
-  </p:timing>
 </p:sld>
 </file>
 

</xml_diff>

<commit_message>
Added new poster on EECS template rather than COE template
</commit_message>
<xml_diff>
--- a/ExpoPoster/fixedPosterRoughDraft.pptx
+++ b/ExpoPoster/fixedPosterRoughDraft.pptx
@@ -252,7 +252,7 @@
             <a:fld id="{9CF59EBC-EC05-6B4D-B166-DDFA6A1EDCB6}" type="datetimeFigureOut">
               <a:rPr lang="en-US" smtClean="0"/>
               <a:pPr/>
-              <a:t>4/27/2018</a:t>
+              <a:t>4/30/2018</a:t>
             </a:fld>
             <a:endParaRPr lang="en-US" dirty="0"/>
           </a:p>
@@ -4759,7 +4759,7 @@
         </p:nvSpPr>
         <p:spPr>
           <a:xfrm>
-            <a:off x="33585118" y="22529998"/>
+            <a:off x="33585118" y="22791256"/>
             <a:ext cx="3759200" cy="707886"/>
           </a:xfrm>
           <a:prstGeom prst="rect">
@@ -4798,7 +4798,7 @@
         </p:nvSpPr>
         <p:spPr>
           <a:xfrm>
-            <a:off x="33585118" y="26429874"/>
+            <a:off x="33585118" y="26168616"/>
             <a:ext cx="3759200" cy="707886"/>
           </a:xfrm>
           <a:prstGeom prst="rect">

</xml_diff>